<commit_message>
update after feedback round
</commit_message>
<xml_diff>
--- a/presentation.pptx
+++ b/presentation.pptx
@@ -5,7 +5,7 @@
     <p:sldMasterId id="2147483648" r:id="rId1"/>
   </p:sldMasterIdLst>
   <p:notesMasterIdLst>
-    <p:notesMasterId r:id="rId25"/>
+    <p:notesMasterId r:id="rId27"/>
   </p:notesMasterIdLst>
   <p:sldIdLst>
     <p:sldId id="257" r:id="rId2"/>
@@ -29,11 +29,13 @@
     <p:sldId id="337" r:id="rId20"/>
     <p:sldId id="340" r:id="rId21"/>
     <p:sldId id="331" r:id="rId22"/>
-    <p:sldId id="332" r:id="rId23"/>
-    <p:sldId id="333" r:id="rId24"/>
+    <p:sldId id="342" r:id="rId23"/>
+    <p:sldId id="343" r:id="rId24"/>
+    <p:sldId id="332" r:id="rId25"/>
+    <p:sldId id="333" r:id="rId26"/>
   </p:sldIdLst>
   <p:sldSz cx="12192000" cy="6858000"/>
-  <p:notesSz cx="6858000" cy="9144000"/>
+  <p:notesSz cx="7104063" cy="10234613"/>
   <p:defaultTextStyle>
     <a:defPPr>
       <a:defRPr lang="zh-CN"/>
@@ -184,17 +186,17 @@
         <p:spPr>
           <a:xfrm>
             <a:off x="0" y="0"/>
-            <a:ext cx="2971800" cy="458788"/>
+            <a:ext cx="3078427" cy="513508"/>
           </a:xfrm>
           <a:prstGeom prst="rect">
             <a:avLst/>
           </a:prstGeom>
         </p:spPr>
         <p:txBody>
-          <a:bodyPr vert="horz" lIns="91440" tIns="45720" rIns="91440" bIns="45720" rtlCol="0"/>
+          <a:bodyPr vert="horz" lIns="99075" tIns="49538" rIns="99075" bIns="49538" rtlCol="0"/>
           <a:lstStyle>
             <a:lvl1pPr algn="l">
-              <a:defRPr sz="1200"/>
+              <a:defRPr sz="1300"/>
             </a:lvl1pPr>
           </a:lstStyle>
           <a:p>
@@ -214,24 +216,24 @@
         </p:nvSpPr>
         <p:spPr>
           <a:xfrm>
-            <a:off x="3884613" y="0"/>
-            <a:ext cx="2971800" cy="458788"/>
+            <a:off x="4023992" y="0"/>
+            <a:ext cx="3078427" cy="513508"/>
           </a:xfrm>
           <a:prstGeom prst="rect">
             <a:avLst/>
           </a:prstGeom>
         </p:spPr>
         <p:txBody>
-          <a:bodyPr vert="horz" lIns="91440" tIns="45720" rIns="91440" bIns="45720" rtlCol="0"/>
+          <a:bodyPr vert="horz" lIns="99075" tIns="49538" rIns="99075" bIns="49538" rtlCol="0"/>
           <a:lstStyle>
             <a:lvl1pPr algn="r">
-              <a:defRPr sz="1200"/>
+              <a:defRPr sz="1300"/>
             </a:lvl1pPr>
           </a:lstStyle>
           <a:p>
             <a:fld id="{321360CE-7F8E-4BBC-8DE0-C0B39D4414C2}" type="datetimeFigureOut">
               <a:rPr lang="zh-CN" altLang="en-US" smtClean="0"/>
-              <a:t>2021/6/26</a:t>
+              <a:t>2021/6/28</a:t>
             </a:fld>
             <a:endParaRPr lang="zh-CN" altLang="en-US"/>
           </a:p>
@@ -249,8 +251,8 @@
         </p:nvSpPr>
         <p:spPr>
           <a:xfrm>
-            <a:off x="685800" y="1143000"/>
-            <a:ext cx="5486400" cy="3086100"/>
+            <a:off x="482600" y="1279525"/>
+            <a:ext cx="6140450" cy="3454400"/>
           </a:xfrm>
           <a:prstGeom prst="rect">
             <a:avLst/>
@@ -263,7 +265,7 @@
           </a:ln>
         </p:spPr>
         <p:txBody>
-          <a:bodyPr vert="horz" lIns="91440" tIns="45720" rIns="91440" bIns="45720" rtlCol="0" anchor="ctr"/>
+          <a:bodyPr vert="horz" lIns="99075" tIns="49538" rIns="99075" bIns="49538" rtlCol="0" anchor="ctr"/>
           <a:lstStyle/>
           <a:p>
             <a:endParaRPr lang="zh-CN" altLang="en-US"/>
@@ -282,15 +284,15 @@
         </p:nvSpPr>
         <p:spPr>
           <a:xfrm>
-            <a:off x="685800" y="4400550"/>
-            <a:ext cx="5486400" cy="3600450"/>
+            <a:off x="710407" y="4925407"/>
+            <a:ext cx="5683250" cy="4029879"/>
           </a:xfrm>
           <a:prstGeom prst="rect">
             <a:avLst/>
           </a:prstGeom>
         </p:spPr>
         <p:txBody>
-          <a:bodyPr vert="horz" lIns="91440" tIns="45720" rIns="91440" bIns="45720" rtlCol="0"/>
+          <a:bodyPr vert="horz" lIns="99075" tIns="49538" rIns="99075" bIns="49538" rtlCol="0"/>
           <a:lstStyle/>
           <a:p>
             <a:pPr lvl="0"/>
@@ -341,18 +343,18 @@
         </p:nvSpPr>
         <p:spPr>
           <a:xfrm>
-            <a:off x="0" y="8685213"/>
-            <a:ext cx="2971800" cy="458787"/>
+            <a:off x="0" y="9721107"/>
+            <a:ext cx="3078427" cy="513507"/>
           </a:xfrm>
           <a:prstGeom prst="rect">
             <a:avLst/>
           </a:prstGeom>
         </p:spPr>
         <p:txBody>
-          <a:bodyPr vert="horz" lIns="91440" tIns="45720" rIns="91440" bIns="45720" rtlCol="0" anchor="b"/>
+          <a:bodyPr vert="horz" lIns="99075" tIns="49538" rIns="99075" bIns="49538" rtlCol="0" anchor="b"/>
           <a:lstStyle>
             <a:lvl1pPr algn="l">
-              <a:defRPr sz="1200"/>
+              <a:defRPr sz="1300"/>
             </a:lvl1pPr>
           </a:lstStyle>
           <a:p>
@@ -372,18 +374,18 @@
         </p:nvSpPr>
         <p:spPr>
           <a:xfrm>
-            <a:off x="3884613" y="8685213"/>
-            <a:ext cx="2971800" cy="458787"/>
+            <a:off x="4023992" y="9721107"/>
+            <a:ext cx="3078427" cy="513507"/>
           </a:xfrm>
           <a:prstGeom prst="rect">
             <a:avLst/>
           </a:prstGeom>
         </p:spPr>
         <p:txBody>
-          <a:bodyPr vert="horz" lIns="91440" tIns="45720" rIns="91440" bIns="45720" rtlCol="0" anchor="b"/>
+          <a:bodyPr vert="horz" lIns="99075" tIns="49538" rIns="99075" bIns="49538" rtlCol="0" anchor="b"/>
           <a:lstStyle>
             <a:lvl1pPr algn="r">
-              <a:defRPr sz="1200"/>
+              <a:defRPr sz="1300"/>
             </a:lvl1pPr>
           </a:lstStyle>
           <a:p>
@@ -645,7 +647,7 @@
           <a:p>
             <a:fld id="{91D23451-175F-46B3-8A69-A89AF1662B41}" type="datetime1">
               <a:rPr lang="en-GB" altLang="zh-CN" smtClean="0"/>
-              <a:t>26/06/2021</a:t>
+              <a:t>28/06/2021</a:t>
             </a:fld>
             <a:endParaRPr lang="zh-CN" altLang="en-US"/>
           </a:p>
@@ -847,7 +849,7 @@
           <a:p>
             <a:fld id="{2AEDD161-246F-4446-AB38-73ECE4CB8B37}" type="datetime1">
               <a:rPr lang="en-GB" altLang="zh-CN" smtClean="0"/>
-              <a:t>26/06/2021</a:t>
+              <a:t>28/06/2021</a:t>
             </a:fld>
             <a:endParaRPr lang="zh-CN" altLang="en-US"/>
           </a:p>
@@ -1059,7 +1061,7 @@
           <a:p>
             <a:fld id="{732F298D-FD30-4DB7-8C68-4BF9F21DA6FB}" type="datetime1">
               <a:rPr lang="en-GB" altLang="zh-CN" smtClean="0"/>
-              <a:t>26/06/2021</a:t>
+              <a:t>28/06/2021</a:t>
             </a:fld>
             <a:endParaRPr lang="zh-CN" altLang="en-US"/>
           </a:p>
@@ -1299,7 +1301,7 @@
           <a:p>
             <a:fld id="{2295BBD5-9ED8-462C-95A7-26000BDC2432}" type="datetime1">
               <a:rPr lang="en-GB" altLang="zh-CN" smtClean="0"/>
-              <a:t>26/06/2021</a:t>
+              <a:t>28/06/2021</a:t>
             </a:fld>
             <a:endParaRPr lang="zh-CN" altLang="en-US"/>
           </a:p>
@@ -1578,7 +1580,7 @@
           <a:p>
             <a:fld id="{7CDA01F7-3A0B-409D-B205-B50673D4C494}" type="datetime1">
               <a:rPr lang="en-GB" altLang="zh-CN" smtClean="0"/>
-              <a:t>26/06/2021</a:t>
+              <a:t>28/06/2021</a:t>
             </a:fld>
             <a:endParaRPr lang="zh-CN" altLang="en-US"/>
           </a:p>
@@ -1847,7 +1849,7 @@
           <a:p>
             <a:fld id="{ED543D09-803B-4B35-AC12-937B5DDBCD8B}" type="datetime1">
               <a:rPr lang="en-GB" altLang="zh-CN" smtClean="0"/>
-              <a:t>26/06/2021</a:t>
+              <a:t>28/06/2021</a:t>
             </a:fld>
             <a:endParaRPr lang="zh-CN" altLang="en-US"/>
           </a:p>
@@ -2263,7 +2265,7 @@
           <a:p>
             <a:fld id="{F238A434-617D-47DE-9240-E23D496ACB73}" type="datetime1">
               <a:rPr lang="en-GB" altLang="zh-CN" smtClean="0"/>
-              <a:t>26/06/2021</a:t>
+              <a:t>28/06/2021</a:t>
             </a:fld>
             <a:endParaRPr lang="zh-CN" altLang="en-US"/>
           </a:p>
@@ -2408,7 +2410,7 @@
           <a:p>
             <a:fld id="{537664EA-A723-41F0-B012-977E9BA4CD68}" type="datetime1">
               <a:rPr lang="en-GB" altLang="zh-CN" smtClean="0"/>
-              <a:t>26/06/2021</a:t>
+              <a:t>28/06/2021</a:t>
             </a:fld>
             <a:endParaRPr lang="zh-CN" altLang="en-US"/>
           </a:p>
@@ -2525,7 +2527,7 @@
           <a:p>
             <a:fld id="{4F069A51-0206-421D-98D7-A825C5A0C706}" type="datetime1">
               <a:rPr lang="en-GB" altLang="zh-CN" smtClean="0"/>
-              <a:t>26/06/2021</a:t>
+              <a:t>28/06/2021</a:t>
             </a:fld>
             <a:endParaRPr lang="zh-CN" altLang="en-US"/>
           </a:p>
@@ -2840,7 +2842,7 @@
           <a:p>
             <a:fld id="{F7A796B1-BD19-405F-A48A-8313A9C0F6D5}" type="datetime1">
               <a:rPr lang="en-GB" altLang="zh-CN" smtClean="0"/>
-              <a:t>26/06/2021</a:t>
+              <a:t>28/06/2021</a:t>
             </a:fld>
             <a:endParaRPr lang="zh-CN" altLang="en-US"/>
           </a:p>
@@ -3132,7 +3134,7 @@
           <a:p>
             <a:fld id="{8BFDB7F2-C357-445B-ABA1-C4B9E95DC6EC}" type="datetime1">
               <a:rPr lang="en-GB" altLang="zh-CN" smtClean="0"/>
-              <a:t>26/06/2021</a:t>
+              <a:t>28/06/2021</a:t>
             </a:fld>
             <a:endParaRPr lang="zh-CN" altLang="en-US"/>
           </a:p>
@@ -3377,7 +3379,7 @@
           <a:p>
             <a:fld id="{CA04AD1D-E3A7-43FD-A138-1C1B560C2697}" type="datetime1">
               <a:rPr lang="en-GB" altLang="zh-CN" smtClean="0"/>
-              <a:t>26/06/2021</a:t>
+              <a:t>28/06/2021</a:t>
             </a:fld>
             <a:endParaRPr lang="zh-CN" altLang="en-US"/>
           </a:p>
@@ -4293,8 +4295,8 @@
           </a:p>
         </p:txBody>
       </p:sp>
-      <mc:AlternateContent xmlns:mc="http://schemas.openxmlformats.org/markup-compatibility/2006">
-        <mc:Choice xmlns:a14="http://schemas.microsoft.com/office/drawing/2010/main" Requires="a14">
+      <mc:AlternateContent xmlns:mc="http://schemas.openxmlformats.org/markup-compatibility/2006" xmlns:a14="http://schemas.microsoft.com/office/drawing/2010/main">
+        <mc:Choice Requires="a14">
           <p:sp>
             <p:nvSpPr>
               <p:cNvPr id="3" name="Content Placeholder 2">
@@ -6383,6 +6385,76 @@
                         </m:r>
                       </m:sup>
                     </m:sSup>
+                    <m:r>
+                      <a:rPr lang="en-GB" b="0" i="1" dirty="0" smtClean="0">
+                        <a:solidFill>
+                          <a:schemeClr val="accent1"/>
+                        </a:solidFill>
+                        <a:latin typeface="Cambria Math" panose="02040503050406030204" pitchFamily="18" charset="0"/>
+                      </a:rPr>
+                      <m:t>(</m:t>
+                    </m:r>
+                    <m:r>
+                      <a:rPr lang="en-GB" b="0" i="1" dirty="0" smtClean="0">
+                        <a:solidFill>
+                          <a:schemeClr val="accent1"/>
+                        </a:solidFill>
+                        <a:latin typeface="Cambria Math" panose="02040503050406030204" pitchFamily="18" charset="0"/>
+                      </a:rPr>
+                      <m:t>𝐴</m:t>
+                    </m:r>
+                    <m:r>
+                      <a:rPr lang="en-GB" b="0" i="1" dirty="0" smtClean="0">
+                        <a:solidFill>
+                          <a:schemeClr val="accent1"/>
+                        </a:solidFill>
+                        <a:latin typeface="Cambria Math" panose="02040503050406030204" pitchFamily="18" charset="0"/>
+                      </a:rPr>
+                      <m:t>,</m:t>
+                    </m:r>
+                    <m:sSub>
+                      <m:sSubPr>
+                        <m:ctrlPr>
+                          <a:rPr lang="en-GB" b="0" i="1" dirty="0" smtClean="0">
+                            <a:solidFill>
+                              <a:schemeClr val="accent1"/>
+                            </a:solidFill>
+                            <a:latin typeface="Cambria Math" panose="02040503050406030204" pitchFamily="18" charset="0"/>
+                          </a:rPr>
+                        </m:ctrlPr>
+                      </m:sSubPr>
+                      <m:e>
+                        <m:r>
+                          <a:rPr lang="en-GB" b="0" i="1" dirty="0" smtClean="0">
+                            <a:solidFill>
+                              <a:schemeClr val="accent1"/>
+                            </a:solidFill>
+                            <a:latin typeface="Cambria Math" panose="02040503050406030204" pitchFamily="18" charset="0"/>
+                          </a:rPr>
+                          <m:t>𝑟</m:t>
+                        </m:r>
+                      </m:e>
+                      <m:sub>
+                        <m:r>
+                          <a:rPr lang="en-GB" b="0" i="1" dirty="0" smtClean="0">
+                            <a:solidFill>
+                              <a:schemeClr val="accent1"/>
+                            </a:solidFill>
+                            <a:latin typeface="Cambria Math" panose="02040503050406030204" pitchFamily="18" charset="0"/>
+                          </a:rPr>
+                          <m:t>0</m:t>
+                        </m:r>
+                      </m:sub>
+                    </m:sSub>
+                    <m:r>
+                      <a:rPr lang="en-GB" b="0" i="1" dirty="0" smtClean="0">
+                        <a:solidFill>
+                          <a:schemeClr val="accent1"/>
+                        </a:solidFill>
+                        <a:latin typeface="Cambria Math" panose="02040503050406030204" pitchFamily="18" charset="0"/>
+                      </a:rPr>
+                      <m:t>)</m:t>
+                    </m:r>
                   </m:oMath>
                 </a14:m>
                 <a:endParaRPr lang="en-GB" dirty="0">
@@ -6405,7 +6477,7 @@
             </p:txBody>
           </p:sp>
         </mc:Choice>
-        <mc:Fallback>
+        <mc:Fallback xmlns="">
           <p:sp>
             <p:nvSpPr>
               <p:cNvPr id="3" name="Content Placeholder 2">
@@ -6704,15 +6776,33 @@
                                   </p:childTnLst>
                                 </p:cTn>
                               </p:par>
+                            </p:childTnLst>
+                          </p:cTn>
+                        </p:par>
+                      </p:childTnLst>
+                    </p:cTn>
+                  </p:par>
+                  <p:par>
+                    <p:cTn id="15" fill="hold">
+                      <p:stCondLst>
+                        <p:cond delay="indefinite"/>
+                      </p:stCondLst>
+                      <p:childTnLst>
+                        <p:par>
+                          <p:cTn id="16" fill="hold">
+                            <p:stCondLst>
+                              <p:cond delay="0"/>
+                            </p:stCondLst>
+                            <p:childTnLst>
                               <p:par>
-                                <p:cTn id="15" presetID="1" presetClass="entr" presetSubtype="0" fill="hold" nodeType="withEffect">
+                                <p:cTn id="17" presetID="1" presetClass="entr" presetSubtype="0" fill="hold" nodeType="clickEffect">
                                   <p:stCondLst>
                                     <p:cond delay="0"/>
                                   </p:stCondLst>
                                   <p:childTnLst>
                                     <p:set>
                                       <p:cBhvr>
-                                        <p:cTn id="16" dur="1" fill="hold">
+                                        <p:cTn id="18" dur="1" fill="hold">
                                           <p:stCondLst>
                                             <p:cond delay="0"/>
                                           </p:stCondLst>
@@ -6742,26 +6832,26 @@
                     </p:cTn>
                   </p:par>
                   <p:par>
-                    <p:cTn id="17" fill="hold">
+                    <p:cTn id="19" fill="hold">
                       <p:stCondLst>
                         <p:cond delay="indefinite"/>
                       </p:stCondLst>
                       <p:childTnLst>
                         <p:par>
-                          <p:cTn id="18" fill="hold">
+                          <p:cTn id="20" fill="hold">
                             <p:stCondLst>
                               <p:cond delay="0"/>
                             </p:stCondLst>
                             <p:childTnLst>
                               <p:par>
-                                <p:cTn id="19" presetID="1" presetClass="entr" presetSubtype="0" fill="hold" nodeType="clickEffect">
+                                <p:cTn id="21" presetID="1" presetClass="entr" presetSubtype="0" fill="hold" nodeType="clickEffect">
                                   <p:stCondLst>
                                     <p:cond delay="0"/>
                                   </p:stCondLst>
                                   <p:childTnLst>
                                     <p:set>
                                       <p:cBhvr>
-                                        <p:cTn id="20" dur="1" fill="hold">
+                                        <p:cTn id="22" dur="1" fill="hold">
                                           <p:stCondLst>
                                             <p:cond delay="0"/>
                                           </p:stCondLst>
@@ -6784,70 +6874,26 @@
                                   </p:childTnLst>
                                 </p:cTn>
                               </p:par>
+                            </p:childTnLst>
+                          </p:cTn>
+                        </p:par>
+                      </p:childTnLst>
+                    </p:cTn>
+                  </p:par>
+                  <p:par>
+                    <p:cTn id="23" fill="hold">
+                      <p:stCondLst>
+                        <p:cond delay="indefinite"/>
+                      </p:stCondLst>
+                      <p:childTnLst>
+                        <p:par>
+                          <p:cTn id="24" fill="hold">
+                            <p:stCondLst>
+                              <p:cond delay="0"/>
+                            </p:stCondLst>
+                            <p:childTnLst>
                               <p:par>
-                                <p:cTn id="21" presetID="1" presetClass="entr" presetSubtype="0" fill="hold" nodeType="withEffect">
-                                  <p:stCondLst>
-                                    <p:cond delay="0"/>
-                                  </p:stCondLst>
-                                  <p:childTnLst>
-                                    <p:set>
-                                      <p:cBhvr>
-                                        <p:cTn id="22" dur="1" fill="hold">
-                                          <p:stCondLst>
-                                            <p:cond delay="0"/>
-                                          </p:stCondLst>
-                                        </p:cTn>
-                                        <p:tgtEl>
-                                          <p:spTgt spid="3">
-                                            <p:txEl>
-                                              <p:pRg st="5" end="5"/>
-                                            </p:txEl>
-                                          </p:spTgt>
-                                        </p:tgtEl>
-                                        <p:attrNameLst>
-                                          <p:attrName>style.visibility</p:attrName>
-                                        </p:attrNameLst>
-                                      </p:cBhvr>
-                                      <p:to>
-                                        <p:strVal val="visible"/>
-                                      </p:to>
-                                    </p:set>
-                                  </p:childTnLst>
-                                </p:cTn>
-                              </p:par>
-                              <p:par>
-                                <p:cTn id="23" presetID="1" presetClass="entr" presetSubtype="0" fill="hold" nodeType="withEffect">
-                                  <p:stCondLst>
-                                    <p:cond delay="0"/>
-                                  </p:stCondLst>
-                                  <p:childTnLst>
-                                    <p:set>
-                                      <p:cBhvr>
-                                        <p:cTn id="24" dur="1" fill="hold">
-                                          <p:stCondLst>
-                                            <p:cond delay="0"/>
-                                          </p:stCondLst>
-                                        </p:cTn>
-                                        <p:tgtEl>
-                                          <p:spTgt spid="3">
-                                            <p:txEl>
-                                              <p:pRg st="6" end="6"/>
-                                            </p:txEl>
-                                          </p:spTgt>
-                                        </p:tgtEl>
-                                        <p:attrNameLst>
-                                          <p:attrName>style.visibility</p:attrName>
-                                        </p:attrNameLst>
-                                      </p:cBhvr>
-                                      <p:to>
-                                        <p:strVal val="visible"/>
-                                      </p:to>
-                                    </p:set>
-                                  </p:childTnLst>
-                                </p:cTn>
-                              </p:par>
-                              <p:par>
-                                <p:cTn id="25" presetID="1" presetClass="entr" presetSubtype="0" fill="hold" nodeType="withEffect">
+                                <p:cTn id="25" presetID="1" presetClass="entr" presetSubtype="0" fill="hold" nodeType="clickEffect">
                                   <p:stCondLst>
                                     <p:cond delay="0"/>
                                   </p:stCondLst>
@@ -6862,7 +6908,7 @@
                                         <p:tgtEl>
                                           <p:spTgt spid="3">
                                             <p:txEl>
-                                              <p:pRg st="7" end="7"/>
+                                              <p:pRg st="5" end="5"/>
                                             </p:txEl>
                                           </p:spTgt>
                                         </p:tgtEl>
@@ -6911,6 +6957,104 @@
                                         <p:tgtEl>
                                           <p:spTgt spid="3">
                                             <p:txEl>
+                                              <p:pRg st="6" end="6"/>
+                                            </p:txEl>
+                                          </p:spTgt>
+                                        </p:tgtEl>
+                                        <p:attrNameLst>
+                                          <p:attrName>style.visibility</p:attrName>
+                                        </p:attrNameLst>
+                                      </p:cBhvr>
+                                      <p:to>
+                                        <p:strVal val="visible"/>
+                                      </p:to>
+                                    </p:set>
+                                  </p:childTnLst>
+                                </p:cTn>
+                              </p:par>
+                            </p:childTnLst>
+                          </p:cTn>
+                        </p:par>
+                      </p:childTnLst>
+                    </p:cTn>
+                  </p:par>
+                  <p:par>
+                    <p:cTn id="31" fill="hold">
+                      <p:stCondLst>
+                        <p:cond delay="indefinite"/>
+                      </p:stCondLst>
+                      <p:childTnLst>
+                        <p:par>
+                          <p:cTn id="32" fill="hold">
+                            <p:stCondLst>
+                              <p:cond delay="0"/>
+                            </p:stCondLst>
+                            <p:childTnLst>
+                              <p:par>
+                                <p:cTn id="33" presetID="1" presetClass="entr" presetSubtype="0" fill="hold" nodeType="clickEffect">
+                                  <p:stCondLst>
+                                    <p:cond delay="0"/>
+                                  </p:stCondLst>
+                                  <p:childTnLst>
+                                    <p:set>
+                                      <p:cBhvr>
+                                        <p:cTn id="34" dur="1" fill="hold">
+                                          <p:stCondLst>
+                                            <p:cond delay="0"/>
+                                          </p:stCondLst>
+                                        </p:cTn>
+                                        <p:tgtEl>
+                                          <p:spTgt spid="3">
+                                            <p:txEl>
+                                              <p:pRg st="7" end="7"/>
+                                            </p:txEl>
+                                          </p:spTgt>
+                                        </p:tgtEl>
+                                        <p:attrNameLst>
+                                          <p:attrName>style.visibility</p:attrName>
+                                        </p:attrNameLst>
+                                      </p:cBhvr>
+                                      <p:to>
+                                        <p:strVal val="visible"/>
+                                      </p:to>
+                                    </p:set>
+                                  </p:childTnLst>
+                                </p:cTn>
+                              </p:par>
+                            </p:childTnLst>
+                          </p:cTn>
+                        </p:par>
+                      </p:childTnLst>
+                    </p:cTn>
+                  </p:par>
+                  <p:par>
+                    <p:cTn id="35" fill="hold">
+                      <p:stCondLst>
+                        <p:cond delay="indefinite"/>
+                      </p:stCondLst>
+                      <p:childTnLst>
+                        <p:par>
+                          <p:cTn id="36" fill="hold">
+                            <p:stCondLst>
+                              <p:cond delay="0"/>
+                            </p:stCondLst>
+                            <p:childTnLst>
+                              <p:par>
+                                <p:cTn id="37" presetID="1" presetClass="entr" presetSubtype="0" fill="hold" nodeType="clickEffect">
+                                  <p:stCondLst>
+                                    <p:cond delay="0"/>
+                                  </p:stCondLst>
+                                  <p:childTnLst>
+                                    <p:set>
+                                      <p:cBhvr>
+                                        <p:cTn id="38" dur="1" fill="hold">
+                                          <p:stCondLst>
+                                            <p:cond delay="0"/>
+                                          </p:stCondLst>
+                                        </p:cTn>
+                                        <p:tgtEl>
+                                          <p:spTgt spid="3">
+                                            <p:txEl>
                                               <p:pRg st="8" end="8"/>
                                             </p:txEl>
                                           </p:spTgt>
@@ -6926,15 +7070,33 @@
                                   </p:childTnLst>
                                 </p:cTn>
                               </p:par>
+                            </p:childTnLst>
+                          </p:cTn>
+                        </p:par>
+                      </p:childTnLst>
+                    </p:cTn>
+                  </p:par>
+                  <p:par>
+                    <p:cTn id="39" fill="hold">
+                      <p:stCondLst>
+                        <p:cond delay="indefinite"/>
+                      </p:stCondLst>
+                      <p:childTnLst>
+                        <p:par>
+                          <p:cTn id="40" fill="hold">
+                            <p:stCondLst>
+                              <p:cond delay="0"/>
+                            </p:stCondLst>
+                            <p:childTnLst>
                               <p:par>
-                                <p:cTn id="31" presetID="1" presetClass="entr" presetSubtype="0" fill="hold" nodeType="withEffect">
+                                <p:cTn id="41" presetID="1" presetClass="entr" presetSubtype="0" fill="hold" nodeType="clickEffect">
                                   <p:stCondLst>
                                     <p:cond delay="0"/>
                                   </p:stCondLst>
                                   <p:childTnLst>
                                     <p:set>
                                       <p:cBhvr>
-                                        <p:cTn id="32" dur="1" fill="hold">
+                                        <p:cTn id="42" dur="1" fill="hold">
                                           <p:stCondLst>
                                             <p:cond delay="0"/>
                                           </p:stCondLst>
@@ -7098,8 +7260,8 @@
           </a:p>
         </p:txBody>
       </p:sp>
-      <mc:AlternateContent xmlns:mc="http://schemas.openxmlformats.org/markup-compatibility/2006">
-        <mc:Choice xmlns:a14="http://schemas.microsoft.com/office/drawing/2010/main" Requires="a14">
+      <mc:AlternateContent xmlns:mc="http://schemas.openxmlformats.org/markup-compatibility/2006" xmlns:a14="http://schemas.microsoft.com/office/drawing/2010/main">
+        <mc:Choice Requires="a14">
           <p:sp>
             <p:nvSpPr>
               <p:cNvPr id="6" name="Content Placeholder 5">
@@ -7119,7 +7281,7 @@
             <p:spPr>
               <a:xfrm>
                 <a:off x="853190" y="1885585"/>
-                <a:ext cx="10515600" cy="4002121"/>
+                <a:ext cx="10515600" cy="3946721"/>
               </a:xfrm>
               <a:prstGeom prst="rect">
                 <a:avLst/>
@@ -7323,6 +7485,62 @@
                         </m:r>
                       </m:sub>
                     </m:sSub>
+                    <m:r>
+                      <a:rPr lang="en-GB" b="0" i="1" smtClean="0">
+                        <a:latin typeface="Cambria Math" panose="02040503050406030204" pitchFamily="18" charset="0"/>
+                        <a:cs typeface="Times New Roman" panose="02020603050405020304" pitchFamily="18" charset="0"/>
+                      </a:rPr>
+                      <m:t>(</m:t>
+                    </m:r>
+                    <m:r>
+                      <a:rPr lang="en-GB" b="0" i="1" smtClean="0">
+                        <a:latin typeface="Cambria Math" panose="02040503050406030204" pitchFamily="18" charset="0"/>
+                        <a:cs typeface="Times New Roman" panose="02020603050405020304" pitchFamily="18" charset="0"/>
+                      </a:rPr>
+                      <m:t>𝐴</m:t>
+                    </m:r>
+                    <m:r>
+                      <a:rPr lang="en-GB" b="0" i="1" smtClean="0">
+                        <a:latin typeface="Cambria Math" panose="02040503050406030204" pitchFamily="18" charset="0"/>
+                        <a:cs typeface="Times New Roman" panose="02020603050405020304" pitchFamily="18" charset="0"/>
+                      </a:rPr>
+                      <m:t>,</m:t>
+                    </m:r>
+                    <m:sSub>
+                      <m:sSubPr>
+                        <m:ctrlPr>
+                          <a:rPr lang="en-GB" b="0" i="1" smtClean="0">
+                            <a:latin typeface="Cambria Math" panose="02040503050406030204" pitchFamily="18" charset="0"/>
+                            <a:cs typeface="Times New Roman" panose="02020603050405020304" pitchFamily="18" charset="0"/>
+                          </a:rPr>
+                        </m:ctrlPr>
+                      </m:sSubPr>
+                      <m:e>
+                        <m:r>
+                          <a:rPr lang="en-GB" b="0" i="1" smtClean="0">
+                            <a:latin typeface="Cambria Math" panose="02040503050406030204" pitchFamily="18" charset="0"/>
+                            <a:cs typeface="Times New Roman" panose="02020603050405020304" pitchFamily="18" charset="0"/>
+                          </a:rPr>
+                          <m:t>𝑟</m:t>
+                        </m:r>
+                      </m:e>
+                      <m:sub>
+                        <m:r>
+                          <a:rPr lang="en-GB" b="0" i="1" smtClean="0">
+                            <a:latin typeface="Cambria Math" panose="02040503050406030204" pitchFamily="18" charset="0"/>
+                            <a:cs typeface="Times New Roman" panose="02020603050405020304" pitchFamily="18" charset="0"/>
+                          </a:rPr>
+                          <m:t>0</m:t>
+                        </m:r>
+                      </m:sub>
+                    </m:sSub>
+                    <m:r>
+                      <a:rPr lang="en-GB" b="0" i="1" smtClean="0">
+                        <a:latin typeface="Cambria Math" panose="02040503050406030204" pitchFamily="18" charset="0"/>
+                        <a:cs typeface="Times New Roman" panose="02020603050405020304" pitchFamily="18" charset="0"/>
+                      </a:rPr>
+                      <m:t>)</m:t>
+                    </m:r>
                   </m:oMath>
                 </a14:m>
                 <a:endParaRPr lang="en-GB" dirty="0">
@@ -7377,6 +7595,54 @@
               </a:p>
               <a:p>
                 <a:pPr lvl="2"/>
+                <a:r>
+                  <a:rPr lang="en-GB" dirty="0">
+                    <a:latin typeface="Times New Roman" panose="02020603050405020304" pitchFamily="18" charset="0"/>
+                    <a:cs typeface="Times New Roman" panose="02020603050405020304" pitchFamily="18" charset="0"/>
+                    <a:sym typeface="Wingdings" panose="05000000000000000000" pitchFamily="2" charset="2"/>
+                  </a:rPr>
+                  <a:t>Orthonormalization of </a:t>
+                </a:r>
+                <a14:m>
+                  <m:oMath xmlns:m="http://schemas.openxmlformats.org/officeDocument/2006/math">
+                    <m:sSub>
+                      <m:sSubPr>
+                        <m:ctrlPr>
+                          <a:rPr lang="en-GB" i="1">
+                            <a:latin typeface="Cambria Math" panose="02040503050406030204" pitchFamily="18" charset="0"/>
+                            <a:cs typeface="Times New Roman" panose="02020603050405020304" pitchFamily="18" charset="0"/>
+                          </a:rPr>
+                        </m:ctrlPr>
+                      </m:sSubPr>
+                      <m:e>
+                        <m:r>
+                          <m:rPr>
+                            <m:nor/>
+                          </m:rPr>
+                          <a:rPr lang="en-DE"/>
+                          <m:t>𝒦</m:t>
+                        </m:r>
+                      </m:e>
+                      <m:sub>
+                        <m:r>
+                          <a:rPr lang="en-GB" i="1">
+                            <a:latin typeface="Cambria Math" panose="02040503050406030204" pitchFamily="18" charset="0"/>
+                            <a:cs typeface="Times New Roman" panose="02020603050405020304" pitchFamily="18" charset="0"/>
+                          </a:rPr>
+                          <m:t>𝑖</m:t>
+                        </m:r>
+                      </m:sub>
+                    </m:sSub>
+                  </m:oMath>
+                </a14:m>
+                <a:endParaRPr lang="en-GB" dirty="0">
+                  <a:latin typeface="Times New Roman" panose="02020603050405020304" pitchFamily="18" charset="0"/>
+                  <a:cs typeface="Times New Roman" panose="02020603050405020304" pitchFamily="18" charset="0"/>
+                  <a:sym typeface="Wingdings" panose="05000000000000000000" pitchFamily="2" charset="2"/>
+                </a:endParaRPr>
+              </a:p>
+              <a:p>
+                <a:pPr lvl="2"/>
                 <a14:m>
                   <m:oMath xmlns:m="http://schemas.openxmlformats.org/officeDocument/2006/math">
                     <m:sSub>
@@ -7696,11 +7962,18 @@
                 </a:r>
               </a:p>
               <a:p>
-                <a:pPr lvl="1"/>
+                <a:pPr lvl="2"/>
+                <a:r>
+                  <a:rPr lang="en-GB" dirty="0">
+                    <a:latin typeface="Times New Roman" panose="02020603050405020304" pitchFamily="18" charset="0"/>
+                    <a:cs typeface="Times New Roman" panose="02020603050405020304" pitchFamily="18" charset="0"/>
+                  </a:rPr>
+                  <a:t>Convergence not guaranteed! (unless </a:t>
+                </a:r>
                 <a14:m>
                   <m:oMath xmlns:m="http://schemas.openxmlformats.org/officeDocument/2006/math">
                     <m:r>
-                      <a:rPr lang="en-GB" b="0" i="1" smtClean="0">
+                      <a:rPr lang="en-GB" i="1" dirty="0" smtClean="0">
                         <a:latin typeface="Cambria Math" panose="02040503050406030204" pitchFamily="18" charset="0"/>
                         <a:cs typeface="Times New Roman" panose="02020603050405020304" pitchFamily="18" charset="0"/>
                       </a:rPr>
@@ -7713,34 +7986,27 @@
                     <a:latin typeface="Times New Roman" panose="02020603050405020304" pitchFamily="18" charset="0"/>
                     <a:cs typeface="Times New Roman" panose="02020603050405020304" pitchFamily="18" charset="0"/>
                   </a:rPr>
-                  <a:t> symmetric</a:t>
+                  <a:t> </a:t>
                 </a:r>
-              </a:p>
-              <a:p>
-                <a:pPr lvl="2"/>
                 <a:r>
-                  <a:rPr lang="en-GB" b="1" dirty="0">
+                  <a:rPr lang="en-GB" dirty="0" err="1">
                     <a:latin typeface="Times New Roman" panose="02020603050405020304" pitchFamily="18" charset="0"/>
                     <a:cs typeface="Times New Roman" panose="02020603050405020304" pitchFamily="18" charset="0"/>
                   </a:rPr>
-                  <a:t>MINRES </a:t>
+                  <a:t>s.p.d.</a:t>
                 </a:r>
                 <a:r>
                   <a:rPr lang="en-GB" dirty="0">
                     <a:latin typeface="Times New Roman" panose="02020603050405020304" pitchFamily="18" charset="0"/>
                     <a:cs typeface="Times New Roman" panose="02020603050405020304" pitchFamily="18" charset="0"/>
                   </a:rPr>
-                  <a:t>(three-term recurrence)</a:t>
+                  <a:t>)</a:t>
                 </a:r>
-                <a:endParaRPr lang="en-GB" b="1" dirty="0">
-                  <a:latin typeface="Times New Roman" panose="02020603050405020304" pitchFamily="18" charset="0"/>
-                  <a:cs typeface="Times New Roman" panose="02020603050405020304" pitchFamily="18" charset="0"/>
-                </a:endParaRPr>
               </a:p>
             </p:txBody>
           </p:sp>
         </mc:Choice>
-        <mc:Fallback>
+        <mc:Fallback xmlns="">
           <p:sp>
             <p:nvSpPr>
               <p:cNvPr id="6" name="Content Placeholder 5">
@@ -7760,7 +8026,7 @@
             <p:spPr>
               <a:xfrm>
                 <a:off x="853190" y="1885585"/>
-                <a:ext cx="10515600" cy="4002121"/>
+                <a:ext cx="10515600" cy="3946721"/>
               </a:xfrm>
               <a:prstGeom prst="rect">
                 <a:avLst/>
@@ -7768,7 +8034,7 @@
               <a:blipFill>
                 <a:blip r:embed="rId2"/>
                 <a:stretch>
-                  <a:fillRect l="-1043" t="-2588" b="-1674"/>
+                  <a:fillRect l="-1043" t="-2623" b="-1698"/>
                 </a:stretch>
               </a:blipFill>
             </p:spPr>
@@ -8035,7 +8301,7 @@
                 <a:cs typeface="Times New Roman" panose="02020603050405020304" pitchFamily="18" charset="0"/>
                 <a:sym typeface="Wingdings" panose="05000000000000000000" pitchFamily="2" charset="2"/>
               </a:rPr>
-              <a:t>Determine preconditioner (before iteration start)</a:t>
+              <a:t>Determine preconditioner (before iteration start, later)</a:t>
             </a:r>
           </a:p>
         </p:txBody>
@@ -8535,7 +8801,7 @@
                 <a:latin typeface="Times New Roman" panose="02020603050405020304" pitchFamily="18" charset="0"/>
                 <a:cs typeface="Times New Roman" panose="02020603050405020304" pitchFamily="18" charset="0"/>
               </a:rPr>
-              <a:t>Polynomial Preconditioning</a:t>
+              <a:t>Preconditioning</a:t>
             </a:r>
             <a:endParaRPr lang="en-DE" b="1" dirty="0">
               <a:latin typeface="Times New Roman" panose="02020603050405020304" pitchFamily="18" charset="0"/>
@@ -8544,8 +8810,8 @@
           </a:p>
         </p:txBody>
       </p:sp>
-      <mc:AlternateContent xmlns:mc="http://schemas.openxmlformats.org/markup-compatibility/2006">
-        <mc:Choice xmlns:a14="http://schemas.microsoft.com/office/drawing/2010/main" Requires="a14">
+      <mc:AlternateContent xmlns:mc="http://schemas.openxmlformats.org/markup-compatibility/2006" xmlns:a14="http://schemas.microsoft.com/office/drawing/2010/main">
+        <mc:Choice Requires="a14">
           <p:sp>
             <p:nvSpPr>
               <p:cNvPr id="3" name="Content Placeholder 2">
@@ -9778,7 +10044,7 @@
             </p:txBody>
           </p:sp>
         </mc:Choice>
-        <mc:Fallback>
+        <mc:Fallback xmlns="">
           <p:sp>
             <p:nvSpPr>
               <p:cNvPr id="3" name="Content Placeholder 2">
@@ -9936,7 +10202,7 @@
                 <a:latin typeface="Times New Roman" panose="02020603050405020304" pitchFamily="18" charset="0"/>
                 <a:cs typeface="Times New Roman" panose="02020603050405020304" pitchFamily="18" charset="0"/>
               </a:rPr>
-              <a:t>Polynomial Preconditioning</a:t>
+              <a:t>Preconditioning</a:t>
             </a:r>
             <a:endParaRPr lang="en-DE" b="1" dirty="0">
               <a:latin typeface="Times New Roman" panose="02020603050405020304" pitchFamily="18" charset="0"/>
@@ -9945,8 +10211,8 @@
           </a:p>
         </p:txBody>
       </p:sp>
-      <mc:AlternateContent xmlns:mc="http://schemas.openxmlformats.org/markup-compatibility/2006">
-        <mc:Choice xmlns:a14="http://schemas.microsoft.com/office/drawing/2010/main" Requires="a14">
+      <mc:AlternateContent xmlns:mc="http://schemas.openxmlformats.org/markup-compatibility/2006" xmlns:a14="http://schemas.microsoft.com/office/drawing/2010/main">
+        <mc:Choice Requires="a14">
           <p:sp>
             <p:nvSpPr>
               <p:cNvPr id="3" name="Content Placeholder 2">
@@ -10298,7 +10564,7 @@
                     <a:cs typeface="Times New Roman" panose="02020603050405020304" pitchFamily="18" charset="0"/>
                     <a:sym typeface="Wingdings" panose="05000000000000000000" pitchFamily="2" charset="2"/>
                   </a:rPr>
-                  <a:t>A random vector, e.g. normally distributed, gives good results in practice</a:t>
+                  <a:t>A random vector, e.g. uniform distributed, gives good results in practice</a:t>
                 </a:r>
               </a:p>
               <a:p>
@@ -11093,7 +11359,7 @@
             </p:txBody>
           </p:sp>
         </mc:Choice>
-        <mc:Fallback>
+        <mc:Fallback xmlns="">
           <p:sp>
             <p:nvSpPr>
               <p:cNvPr id="3" name="Content Placeholder 2">
@@ -11225,8 +11491,8 @@
           <a:chExt cx="0" cy="0"/>
         </a:xfrm>
       </p:grpSpPr>
-      <mc:AlternateContent xmlns:mc="http://schemas.openxmlformats.org/markup-compatibility/2006">
-        <mc:Choice xmlns:a14="http://schemas.microsoft.com/office/drawing/2010/main" Requires="a14">
+      <mc:AlternateContent xmlns:mc="http://schemas.openxmlformats.org/markup-compatibility/2006" xmlns:a14="http://schemas.microsoft.com/office/drawing/2010/main">
+        <mc:Choice Requires="a14">
           <p:sp>
             <p:nvSpPr>
               <p:cNvPr id="2" name="Title 1">
@@ -11273,7 +11539,7 @@
             </p:txBody>
           </p:sp>
         </mc:Choice>
-        <mc:Fallback>
+        <mc:Fallback xmlns="">
           <p:sp>
             <p:nvSpPr>
               <p:cNvPr id="2" name="Title 1">
@@ -11606,8 +11872,8 @@
           </a:extLst>
         </p:spPr>
       </p:pic>
-      <mc:AlternateContent xmlns:mc="http://schemas.openxmlformats.org/markup-compatibility/2006">
-        <mc:Choice xmlns:a14="http://schemas.microsoft.com/office/drawing/2010/main" Requires="a14">
+      <mc:AlternateContent xmlns:mc="http://schemas.openxmlformats.org/markup-compatibility/2006" xmlns:a14="http://schemas.microsoft.com/office/drawing/2010/main">
+        <mc:Choice Requires="a14">
           <p:sp>
             <p:nvSpPr>
               <p:cNvPr id="13" name="TextBox 12">
@@ -11699,7 +11965,7 @@
                         <a:latin typeface="Cambria Math" panose="02040503050406030204" pitchFamily="18" charset="0"/>
                         <a:cs typeface="Times New Roman" panose="02020603050405020304" pitchFamily="18" charset="0"/>
                       </a:rPr>
-                      <m:t>-06</m:t>
+                      <m:t>−06</m:t>
                     </m:r>
                   </m:oMath>
                 </a14:m>
@@ -11745,7 +12011,7 @@
                         <a:latin typeface="Cambria Math" panose="02040503050406030204" pitchFamily="18" charset="0"/>
                         <a:cs typeface="Times New Roman" panose="02020603050405020304" pitchFamily="18" charset="0"/>
                       </a:rPr>
-                      <m:t>=-0.0012</m:t>
+                      <m:t>=−0.0012</m:t>
                     </m:r>
                     <m:r>
                       <a:rPr lang="en-GB" sz="2400" b="0" i="1" smtClean="0">
@@ -11817,7 +12083,7 @@
             </p:txBody>
           </p:sp>
         </mc:Choice>
-        <mc:Fallback>
+        <mc:Fallback xmlns="">
           <p:sp>
             <p:nvSpPr>
               <p:cNvPr id="13" name="TextBox 12">
@@ -11918,7 +12184,7 @@
                 <a:latin typeface="Times New Roman" panose="02020603050405020304" pitchFamily="18" charset="0"/>
                 <a:cs typeface="Times New Roman" panose="02020603050405020304" pitchFamily="18" charset="0"/>
               </a:rPr>
-              <a:t>Polynomial Preconditioning</a:t>
+              <a:t>Preconditioning</a:t>
             </a:r>
             <a:endParaRPr lang="en-DE" b="1" dirty="0">
               <a:latin typeface="Times New Roman" panose="02020603050405020304" pitchFamily="18" charset="0"/>
@@ -11927,8 +12193,8 @@
           </a:p>
         </p:txBody>
       </p:sp>
-      <mc:AlternateContent xmlns:mc="http://schemas.openxmlformats.org/markup-compatibility/2006">
-        <mc:Choice xmlns:a14="http://schemas.microsoft.com/office/drawing/2010/main" Requires="a14">
+      <mc:AlternateContent xmlns:mc="http://schemas.openxmlformats.org/markup-compatibility/2006" xmlns:a14="http://schemas.microsoft.com/office/drawing/2010/main">
+        <mc:Choice Requires="a14">
           <p:sp>
             <p:nvSpPr>
               <p:cNvPr id="3" name="Content Placeholder 2">
@@ -13388,7 +13654,7 @@
                     <a:cs typeface="Times New Roman" panose="02020603050405020304" pitchFamily="18" charset="0"/>
                     <a:sym typeface="Wingdings" panose="05000000000000000000" pitchFamily="2" charset="2"/>
                   </a:rPr>
-                  <a:t>Residuals relative to preconditioned system (GMRES)</a:t>
+                  <a:t>Residuals relative to preconditioned system</a:t>
                 </a:r>
               </a:p>
               <a:p>
@@ -13415,7 +13681,7 @@
                     <a:cs typeface="Times New Roman" panose="02020603050405020304" pitchFamily="18" charset="0"/>
                     <a:sym typeface="Wingdings" panose="05000000000000000000" pitchFamily="2" charset="2"/>
                   </a:rPr>
-                  <a:t>: </a:t>
+                  <a:t>: solve </a:t>
                 </a:r>
                 <a14:m>
                   <m:oMath xmlns:m="http://schemas.openxmlformats.org/officeDocument/2006/math">
@@ -13544,7 +13810,7 @@
             </p:txBody>
           </p:sp>
         </mc:Choice>
-        <mc:Fallback>
+        <mc:Fallback xmlns="">
           <p:sp>
             <p:nvSpPr>
               <p:cNvPr id="3" name="Content Placeholder 2">
@@ -13656,575 +13922,6 @@
   <p:clrMapOvr>
     <a:masterClrMapping/>
   </p:clrMapOvr>
-  <p:timing>
-    <p:tnLst>
-      <p:par>
-        <p:cTn id="1" dur="indefinite" restart="never" nodeType="tmRoot">
-          <p:childTnLst>
-            <p:seq concurrent="1" nextAc="seek">
-              <p:cTn id="2" dur="indefinite" nodeType="mainSeq">
-                <p:childTnLst>
-                  <p:par>
-                    <p:cTn id="3" fill="hold">
-                      <p:stCondLst>
-                        <p:cond delay="indefinite"/>
-                      </p:stCondLst>
-                      <p:childTnLst>
-                        <p:par>
-                          <p:cTn id="4" fill="hold">
-                            <p:stCondLst>
-                              <p:cond delay="0"/>
-                            </p:stCondLst>
-                            <p:childTnLst>
-                              <p:par>
-                                <p:cTn id="5" presetID="1" presetClass="entr" presetSubtype="0" fill="hold" nodeType="clickEffect">
-                                  <p:stCondLst>
-                                    <p:cond delay="0"/>
-                                  </p:stCondLst>
-                                  <p:childTnLst>
-                                    <p:set>
-                                      <p:cBhvr>
-                                        <p:cTn id="6" dur="1" fill="hold">
-                                          <p:stCondLst>
-                                            <p:cond delay="0"/>
-                                          </p:stCondLst>
-                                        </p:cTn>
-                                        <p:tgtEl>
-                                          <p:spTgt spid="3">
-                                            <p:txEl>
-                                              <p:pRg st="0" end="0"/>
-                                            </p:txEl>
-                                          </p:spTgt>
-                                        </p:tgtEl>
-                                        <p:attrNameLst>
-                                          <p:attrName>style.visibility</p:attrName>
-                                        </p:attrNameLst>
-                                      </p:cBhvr>
-                                      <p:to>
-                                        <p:strVal val="visible"/>
-                                      </p:to>
-                                    </p:set>
-                                  </p:childTnLst>
-                                </p:cTn>
-                              </p:par>
-                            </p:childTnLst>
-                          </p:cTn>
-                        </p:par>
-                      </p:childTnLst>
-                    </p:cTn>
-                  </p:par>
-                  <p:par>
-                    <p:cTn id="7" fill="hold">
-                      <p:stCondLst>
-                        <p:cond delay="indefinite"/>
-                      </p:stCondLst>
-                      <p:childTnLst>
-                        <p:par>
-                          <p:cTn id="8" fill="hold">
-                            <p:stCondLst>
-                              <p:cond delay="0"/>
-                            </p:stCondLst>
-                            <p:childTnLst>
-                              <p:par>
-                                <p:cTn id="9" presetID="1" presetClass="entr" presetSubtype="0" fill="hold" nodeType="clickEffect">
-                                  <p:stCondLst>
-                                    <p:cond delay="0"/>
-                                  </p:stCondLst>
-                                  <p:childTnLst>
-                                    <p:set>
-                                      <p:cBhvr>
-                                        <p:cTn id="10" dur="1" fill="hold">
-                                          <p:stCondLst>
-                                            <p:cond delay="0"/>
-                                          </p:stCondLst>
-                                        </p:cTn>
-                                        <p:tgtEl>
-                                          <p:spTgt spid="3">
-                                            <p:txEl>
-                                              <p:pRg st="1" end="1"/>
-                                            </p:txEl>
-                                          </p:spTgt>
-                                        </p:tgtEl>
-                                        <p:attrNameLst>
-                                          <p:attrName>style.visibility</p:attrName>
-                                        </p:attrNameLst>
-                                      </p:cBhvr>
-                                      <p:to>
-                                        <p:strVal val="visible"/>
-                                      </p:to>
-                                    </p:set>
-                                  </p:childTnLst>
-                                </p:cTn>
-                              </p:par>
-                            </p:childTnLst>
-                          </p:cTn>
-                        </p:par>
-                      </p:childTnLst>
-                    </p:cTn>
-                  </p:par>
-                  <p:par>
-                    <p:cTn id="11" fill="hold">
-                      <p:stCondLst>
-                        <p:cond delay="indefinite"/>
-                      </p:stCondLst>
-                      <p:childTnLst>
-                        <p:par>
-                          <p:cTn id="12" fill="hold">
-                            <p:stCondLst>
-                              <p:cond delay="0"/>
-                            </p:stCondLst>
-                            <p:childTnLst>
-                              <p:par>
-                                <p:cTn id="13" presetID="1" presetClass="entr" presetSubtype="0" fill="hold" nodeType="clickEffect">
-                                  <p:stCondLst>
-                                    <p:cond delay="0"/>
-                                  </p:stCondLst>
-                                  <p:childTnLst>
-                                    <p:set>
-                                      <p:cBhvr>
-                                        <p:cTn id="14" dur="1" fill="hold">
-                                          <p:stCondLst>
-                                            <p:cond delay="0"/>
-                                          </p:stCondLst>
-                                        </p:cTn>
-                                        <p:tgtEl>
-                                          <p:spTgt spid="3">
-                                            <p:txEl>
-                                              <p:pRg st="2" end="2"/>
-                                            </p:txEl>
-                                          </p:spTgt>
-                                        </p:tgtEl>
-                                        <p:attrNameLst>
-                                          <p:attrName>style.visibility</p:attrName>
-                                        </p:attrNameLst>
-                                      </p:cBhvr>
-                                      <p:to>
-                                        <p:strVal val="visible"/>
-                                      </p:to>
-                                    </p:set>
-                                  </p:childTnLst>
-                                </p:cTn>
-                              </p:par>
-                            </p:childTnLst>
-                          </p:cTn>
-                        </p:par>
-                      </p:childTnLst>
-                    </p:cTn>
-                  </p:par>
-                  <p:par>
-                    <p:cTn id="15" fill="hold">
-                      <p:stCondLst>
-                        <p:cond delay="indefinite"/>
-                      </p:stCondLst>
-                      <p:childTnLst>
-                        <p:par>
-                          <p:cTn id="16" fill="hold">
-                            <p:stCondLst>
-                              <p:cond delay="0"/>
-                            </p:stCondLst>
-                            <p:childTnLst>
-                              <p:par>
-                                <p:cTn id="17" presetID="1" presetClass="entr" presetSubtype="0" fill="hold" nodeType="clickEffect">
-                                  <p:stCondLst>
-                                    <p:cond delay="0"/>
-                                  </p:stCondLst>
-                                  <p:childTnLst>
-                                    <p:set>
-                                      <p:cBhvr>
-                                        <p:cTn id="18" dur="1" fill="hold">
-                                          <p:stCondLst>
-                                            <p:cond delay="0"/>
-                                          </p:stCondLst>
-                                        </p:cTn>
-                                        <p:tgtEl>
-                                          <p:spTgt spid="3">
-                                            <p:txEl>
-                                              <p:pRg st="3" end="3"/>
-                                            </p:txEl>
-                                          </p:spTgt>
-                                        </p:tgtEl>
-                                        <p:attrNameLst>
-                                          <p:attrName>style.visibility</p:attrName>
-                                        </p:attrNameLst>
-                                      </p:cBhvr>
-                                      <p:to>
-                                        <p:strVal val="visible"/>
-                                      </p:to>
-                                    </p:set>
-                                  </p:childTnLst>
-                                </p:cTn>
-                              </p:par>
-                            </p:childTnLst>
-                          </p:cTn>
-                        </p:par>
-                      </p:childTnLst>
-                    </p:cTn>
-                  </p:par>
-                  <p:par>
-                    <p:cTn id="19" fill="hold">
-                      <p:stCondLst>
-                        <p:cond delay="indefinite"/>
-                      </p:stCondLst>
-                      <p:childTnLst>
-                        <p:par>
-                          <p:cTn id="20" fill="hold">
-                            <p:stCondLst>
-                              <p:cond delay="0"/>
-                            </p:stCondLst>
-                            <p:childTnLst>
-                              <p:par>
-                                <p:cTn id="21" presetID="1" presetClass="entr" presetSubtype="0" fill="hold" nodeType="clickEffect">
-                                  <p:stCondLst>
-                                    <p:cond delay="0"/>
-                                  </p:stCondLst>
-                                  <p:childTnLst>
-                                    <p:set>
-                                      <p:cBhvr>
-                                        <p:cTn id="22" dur="1" fill="hold">
-                                          <p:stCondLst>
-                                            <p:cond delay="0"/>
-                                          </p:stCondLst>
-                                        </p:cTn>
-                                        <p:tgtEl>
-                                          <p:spTgt spid="3">
-                                            <p:txEl>
-                                              <p:pRg st="4" end="4"/>
-                                            </p:txEl>
-                                          </p:spTgt>
-                                        </p:tgtEl>
-                                        <p:attrNameLst>
-                                          <p:attrName>style.visibility</p:attrName>
-                                        </p:attrNameLst>
-                                      </p:cBhvr>
-                                      <p:to>
-                                        <p:strVal val="visible"/>
-                                      </p:to>
-                                    </p:set>
-                                  </p:childTnLst>
-                                </p:cTn>
-                              </p:par>
-                            </p:childTnLst>
-                          </p:cTn>
-                        </p:par>
-                      </p:childTnLst>
-                    </p:cTn>
-                  </p:par>
-                  <p:par>
-                    <p:cTn id="23" fill="hold">
-                      <p:stCondLst>
-                        <p:cond delay="indefinite"/>
-                      </p:stCondLst>
-                      <p:childTnLst>
-                        <p:par>
-                          <p:cTn id="24" fill="hold">
-                            <p:stCondLst>
-                              <p:cond delay="0"/>
-                            </p:stCondLst>
-                            <p:childTnLst>
-                              <p:par>
-                                <p:cTn id="25" presetID="1" presetClass="entr" presetSubtype="0" fill="hold" nodeType="clickEffect">
-                                  <p:stCondLst>
-                                    <p:cond delay="0"/>
-                                  </p:stCondLst>
-                                  <p:childTnLst>
-                                    <p:set>
-                                      <p:cBhvr>
-                                        <p:cTn id="26" dur="1" fill="hold">
-                                          <p:stCondLst>
-                                            <p:cond delay="0"/>
-                                          </p:stCondLst>
-                                        </p:cTn>
-                                        <p:tgtEl>
-                                          <p:spTgt spid="3">
-                                            <p:txEl>
-                                              <p:pRg st="5" end="5"/>
-                                            </p:txEl>
-                                          </p:spTgt>
-                                        </p:tgtEl>
-                                        <p:attrNameLst>
-                                          <p:attrName>style.visibility</p:attrName>
-                                        </p:attrNameLst>
-                                      </p:cBhvr>
-                                      <p:to>
-                                        <p:strVal val="visible"/>
-                                      </p:to>
-                                    </p:set>
-                                  </p:childTnLst>
-                                </p:cTn>
-                              </p:par>
-                            </p:childTnLst>
-                          </p:cTn>
-                        </p:par>
-                      </p:childTnLst>
-                    </p:cTn>
-                  </p:par>
-                  <p:par>
-                    <p:cTn id="27" fill="hold">
-                      <p:stCondLst>
-                        <p:cond delay="indefinite"/>
-                      </p:stCondLst>
-                      <p:childTnLst>
-                        <p:par>
-                          <p:cTn id="28" fill="hold">
-                            <p:stCondLst>
-                              <p:cond delay="0"/>
-                            </p:stCondLst>
-                            <p:childTnLst>
-                              <p:par>
-                                <p:cTn id="29" presetID="1" presetClass="entr" presetSubtype="0" fill="hold" nodeType="clickEffect">
-                                  <p:stCondLst>
-                                    <p:cond delay="0"/>
-                                  </p:stCondLst>
-                                  <p:childTnLst>
-                                    <p:set>
-                                      <p:cBhvr>
-                                        <p:cTn id="30" dur="1" fill="hold">
-                                          <p:stCondLst>
-                                            <p:cond delay="0"/>
-                                          </p:stCondLst>
-                                        </p:cTn>
-                                        <p:tgtEl>
-                                          <p:spTgt spid="3">
-                                            <p:txEl>
-                                              <p:pRg st="7" end="7"/>
-                                            </p:txEl>
-                                          </p:spTgt>
-                                        </p:tgtEl>
-                                        <p:attrNameLst>
-                                          <p:attrName>style.visibility</p:attrName>
-                                        </p:attrNameLst>
-                                      </p:cBhvr>
-                                      <p:to>
-                                        <p:strVal val="visible"/>
-                                      </p:to>
-                                    </p:set>
-                                  </p:childTnLst>
-                                </p:cTn>
-                              </p:par>
-                            </p:childTnLst>
-                          </p:cTn>
-                        </p:par>
-                      </p:childTnLst>
-                    </p:cTn>
-                  </p:par>
-                  <p:par>
-                    <p:cTn id="31" fill="hold">
-                      <p:stCondLst>
-                        <p:cond delay="indefinite"/>
-                      </p:stCondLst>
-                      <p:childTnLst>
-                        <p:par>
-                          <p:cTn id="32" fill="hold">
-                            <p:stCondLst>
-                              <p:cond delay="0"/>
-                            </p:stCondLst>
-                            <p:childTnLst>
-                              <p:par>
-                                <p:cTn id="33" presetID="1" presetClass="entr" presetSubtype="0" fill="hold" nodeType="clickEffect">
-                                  <p:stCondLst>
-                                    <p:cond delay="0"/>
-                                  </p:stCondLst>
-                                  <p:childTnLst>
-                                    <p:set>
-                                      <p:cBhvr>
-                                        <p:cTn id="34" dur="1" fill="hold">
-                                          <p:stCondLst>
-                                            <p:cond delay="0"/>
-                                          </p:stCondLst>
-                                        </p:cTn>
-                                        <p:tgtEl>
-                                          <p:spTgt spid="3">
-                                            <p:txEl>
-                                              <p:pRg st="8" end="8"/>
-                                            </p:txEl>
-                                          </p:spTgt>
-                                        </p:tgtEl>
-                                        <p:attrNameLst>
-                                          <p:attrName>style.visibility</p:attrName>
-                                        </p:attrNameLst>
-                                      </p:cBhvr>
-                                      <p:to>
-                                        <p:strVal val="visible"/>
-                                      </p:to>
-                                    </p:set>
-                                  </p:childTnLst>
-                                </p:cTn>
-                              </p:par>
-                            </p:childTnLst>
-                          </p:cTn>
-                        </p:par>
-                      </p:childTnLst>
-                    </p:cTn>
-                  </p:par>
-                  <p:par>
-                    <p:cTn id="35" fill="hold">
-                      <p:stCondLst>
-                        <p:cond delay="indefinite"/>
-                      </p:stCondLst>
-                      <p:childTnLst>
-                        <p:par>
-                          <p:cTn id="36" fill="hold">
-                            <p:stCondLst>
-                              <p:cond delay="0"/>
-                            </p:stCondLst>
-                            <p:childTnLst>
-                              <p:par>
-                                <p:cTn id="37" presetID="1" presetClass="entr" presetSubtype="0" fill="hold" nodeType="clickEffect">
-                                  <p:stCondLst>
-                                    <p:cond delay="0"/>
-                                  </p:stCondLst>
-                                  <p:childTnLst>
-                                    <p:set>
-                                      <p:cBhvr>
-                                        <p:cTn id="38" dur="1" fill="hold">
-                                          <p:stCondLst>
-                                            <p:cond delay="0"/>
-                                          </p:stCondLst>
-                                        </p:cTn>
-                                        <p:tgtEl>
-                                          <p:spTgt spid="3">
-                                            <p:txEl>
-                                              <p:pRg st="9" end="9"/>
-                                            </p:txEl>
-                                          </p:spTgt>
-                                        </p:tgtEl>
-                                        <p:attrNameLst>
-                                          <p:attrName>style.visibility</p:attrName>
-                                        </p:attrNameLst>
-                                      </p:cBhvr>
-                                      <p:to>
-                                        <p:strVal val="visible"/>
-                                      </p:to>
-                                    </p:set>
-                                  </p:childTnLst>
-                                </p:cTn>
-                              </p:par>
-                            </p:childTnLst>
-                          </p:cTn>
-                        </p:par>
-                      </p:childTnLst>
-                    </p:cTn>
-                  </p:par>
-                  <p:par>
-                    <p:cTn id="39" fill="hold">
-                      <p:stCondLst>
-                        <p:cond delay="indefinite"/>
-                      </p:stCondLst>
-                      <p:childTnLst>
-                        <p:par>
-                          <p:cTn id="40" fill="hold">
-                            <p:stCondLst>
-                              <p:cond delay="0"/>
-                            </p:stCondLst>
-                            <p:childTnLst>
-                              <p:par>
-                                <p:cTn id="41" presetID="1" presetClass="entr" presetSubtype="0" fill="hold" nodeType="clickEffect">
-                                  <p:stCondLst>
-                                    <p:cond delay="0"/>
-                                  </p:stCondLst>
-                                  <p:childTnLst>
-                                    <p:set>
-                                      <p:cBhvr>
-                                        <p:cTn id="42" dur="1" fill="hold">
-                                          <p:stCondLst>
-                                            <p:cond delay="0"/>
-                                          </p:stCondLst>
-                                        </p:cTn>
-                                        <p:tgtEl>
-                                          <p:spTgt spid="3">
-                                            <p:txEl>
-                                              <p:pRg st="11" end="11"/>
-                                            </p:txEl>
-                                          </p:spTgt>
-                                        </p:tgtEl>
-                                        <p:attrNameLst>
-                                          <p:attrName>style.visibility</p:attrName>
-                                        </p:attrNameLst>
-                                      </p:cBhvr>
-                                      <p:to>
-                                        <p:strVal val="visible"/>
-                                      </p:to>
-                                    </p:set>
-                                  </p:childTnLst>
-                                </p:cTn>
-                              </p:par>
-                            </p:childTnLst>
-                          </p:cTn>
-                        </p:par>
-                      </p:childTnLst>
-                    </p:cTn>
-                  </p:par>
-                  <p:par>
-                    <p:cTn id="43" fill="hold">
-                      <p:stCondLst>
-                        <p:cond delay="indefinite"/>
-                      </p:stCondLst>
-                      <p:childTnLst>
-                        <p:par>
-                          <p:cTn id="44" fill="hold">
-                            <p:stCondLst>
-                              <p:cond delay="0"/>
-                            </p:stCondLst>
-                            <p:childTnLst>
-                              <p:par>
-                                <p:cTn id="45" presetID="1" presetClass="entr" presetSubtype="0" fill="hold" nodeType="clickEffect">
-                                  <p:stCondLst>
-                                    <p:cond delay="0"/>
-                                  </p:stCondLst>
-                                  <p:childTnLst>
-                                    <p:set>
-                                      <p:cBhvr>
-                                        <p:cTn id="46" dur="1" fill="hold">
-                                          <p:stCondLst>
-                                            <p:cond delay="0"/>
-                                          </p:stCondLst>
-                                        </p:cTn>
-                                        <p:tgtEl>
-                                          <p:spTgt spid="3">
-                                            <p:txEl>
-                                              <p:pRg st="12" end="12"/>
-                                            </p:txEl>
-                                          </p:spTgt>
-                                        </p:tgtEl>
-                                        <p:attrNameLst>
-                                          <p:attrName>style.visibility</p:attrName>
-                                        </p:attrNameLst>
-                                      </p:cBhvr>
-                                      <p:to>
-                                        <p:strVal val="visible"/>
-                                      </p:to>
-                                    </p:set>
-                                  </p:childTnLst>
-                                </p:cTn>
-                              </p:par>
-                            </p:childTnLst>
-                          </p:cTn>
-                        </p:par>
-                      </p:childTnLst>
-                    </p:cTn>
-                  </p:par>
-                </p:childTnLst>
-              </p:cTn>
-              <p:prevCondLst>
-                <p:cond evt="onPrev" delay="0">
-                  <p:tgtEl>
-                    <p:sldTgt/>
-                  </p:tgtEl>
-                </p:cond>
-              </p:prevCondLst>
-              <p:nextCondLst>
-                <p:cond evt="onNext" delay="0">
-                  <p:tgtEl>
-                    <p:sldTgt/>
-                  </p:tgtEl>
-                </p:cond>
-              </p:nextCondLst>
-            </p:seq>
-          </p:childTnLst>
-        </p:cTn>
-      </p:par>
-    </p:tnLst>
-  </p:timing>
 </p:sld>
 </file>
 
@@ -14303,8 +14000,8 @@
           </a:p>
         </p:txBody>
       </p:sp>
-      <mc:AlternateContent xmlns:mc="http://schemas.openxmlformats.org/markup-compatibility/2006">
-        <mc:Choice xmlns:a14="http://schemas.microsoft.com/office/drawing/2010/main" Requires="a14">
+      <mc:AlternateContent xmlns:mc="http://schemas.openxmlformats.org/markup-compatibility/2006" xmlns:a14="http://schemas.microsoft.com/office/drawing/2010/main">
+        <mc:Choice Requires="a14">
           <p:sp>
             <p:nvSpPr>
               <p:cNvPr id="9" name="Content Placeholder 2">
@@ -14376,7 +14073,7 @@
               <a:p>
                 <a:r>
                   <a:rPr lang="en-GB" dirty="0"/>
-                  <a:t>5000 Iterations</a:t>
+                  <a:t>20,000 Iterations</a:t>
                 </a:r>
               </a:p>
               <a:p>
@@ -14433,7 +14130,7 @@
             </p:txBody>
           </p:sp>
         </mc:Choice>
-        <mc:Fallback>
+        <mc:Fallback xmlns="">
           <p:sp>
             <p:nvSpPr>
               <p:cNvPr id="9" name="Content Placeholder 2">
@@ -14477,45 +14174,10 @@
           </p:sp>
         </mc:Fallback>
       </mc:AlternateContent>
-      <p:pic>
-        <p:nvPicPr>
-          <p:cNvPr id="11" name="Picture 10">
-            <a:extLst>
-              <a:ext uri="{FF2B5EF4-FFF2-40B4-BE49-F238E27FC236}">
-                <a16:creationId xmlns:a16="http://schemas.microsoft.com/office/drawing/2014/main" id="{3B56E701-5966-4FA6-8612-8C1BA099EE49}"/>
-              </a:ext>
-            </a:extLst>
-          </p:cNvPr>
-          <p:cNvPicPr>
-            <a:picLocks noChangeAspect="1"/>
-          </p:cNvPicPr>
-          <p:nvPr/>
-        </p:nvPicPr>
-        <p:blipFill rotWithShape="1">
-          <a:blip r:embed="rId3">
-            <a:extLst>
-              <a:ext uri="{28A0092B-C50C-407E-A947-70E740481C1C}">
-                <a14:useLocalDpi xmlns:a14="http://schemas.microsoft.com/office/drawing/2010/main" val="0"/>
-              </a:ext>
-            </a:extLst>
-          </a:blip>
-          <a:srcRect r="6934"/>
-          <a:stretch/>
-        </p:blipFill>
-        <p:spPr>
-          <a:xfrm>
-            <a:off x="0" y="345293"/>
-            <a:ext cx="7174524" cy="5870380"/>
-          </a:xfrm>
-          <a:prstGeom prst="rect">
-            <a:avLst/>
-          </a:prstGeom>
-        </p:spPr>
-      </p:pic>
       <p:sp>
         <p:nvSpPr>
           <p:cNvPr id="14" name="Action Button: Go Back or Previous 13">
-            <a:hlinkClick r:id="rId4" action="ppaction://hlinksldjump" highlightClick="1"/>
+            <a:hlinkClick r:id="rId3" action="ppaction://hlinksldjump" highlightClick="1"/>
             <a:extLst>
               <a:ext uri="{FF2B5EF4-FFF2-40B4-BE49-F238E27FC236}">
                 <a16:creationId xmlns:a16="http://schemas.microsoft.com/office/drawing/2014/main" id="{63A75D64-DEC1-4977-9636-E9F5A1B71BB1}"/>
@@ -14565,6 +14227,35 @@
           </a:p>
         </p:txBody>
       </p:sp>
+      <p:pic>
+        <p:nvPicPr>
+          <p:cNvPr id="3" name="Picture 2">
+            <a:extLst>
+              <a:ext uri="{FF2B5EF4-FFF2-40B4-BE49-F238E27FC236}">
+                <a16:creationId xmlns:a16="http://schemas.microsoft.com/office/drawing/2014/main" id="{8723A1D7-3C46-4EF3-AD7B-92F6B0856C90}"/>
+              </a:ext>
+            </a:extLst>
+          </p:cNvPr>
+          <p:cNvPicPr>
+            <a:picLocks noChangeAspect="1"/>
+          </p:cNvPicPr>
+          <p:nvPr/>
+        </p:nvPicPr>
+        <p:blipFill rotWithShape="1">
+          <a:blip r:embed="rId4"/>
+          <a:srcRect l="5099" t="5287" r="7944"/>
+          <a:stretch/>
+        </p:blipFill>
+        <p:spPr>
+          <a:xfrm>
+            <a:off x="-1" y="578406"/>
+            <a:ext cx="7357403" cy="5629759"/>
+          </a:xfrm>
+          <a:prstGeom prst="rect">
+            <a:avLst/>
+          </a:prstGeom>
+        </p:spPr>
+      </p:pic>
     </p:spTree>
     <p:extLst>
       <p:ext uri="{BB962C8B-B14F-4D97-AF65-F5344CB8AC3E}">
@@ -14653,8 +14344,8 @@
           </a:p>
         </p:txBody>
       </p:sp>
-      <mc:AlternateContent xmlns:mc="http://schemas.openxmlformats.org/markup-compatibility/2006">
-        <mc:Choice xmlns:a14="http://schemas.microsoft.com/office/drawing/2010/main" Requires="a14">
+      <mc:AlternateContent xmlns:mc="http://schemas.openxmlformats.org/markup-compatibility/2006" xmlns:a14="http://schemas.microsoft.com/office/drawing/2010/main">
+        <mc:Choice Requires="a14">
           <p:sp>
             <p:nvSpPr>
               <p:cNvPr id="9" name="Content Placeholder 2">
@@ -14732,7 +14423,7 @@
               <a:p>
                 <a:r>
                   <a:rPr lang="en-GB" dirty="0"/>
-                  <a:t>5000 Iterations</a:t>
+                  <a:t>20,000 Iterations</a:t>
                 </a:r>
               </a:p>
               <a:p>
@@ -14818,7 +14509,7 @@
             </p:txBody>
           </p:sp>
         </mc:Choice>
-        <mc:Fallback>
+        <mc:Fallback xmlns="">
           <p:sp>
             <p:nvSpPr>
               <p:cNvPr id="9" name="Content Placeholder 2">
@@ -14864,10 +14555,10 @@
       </mc:AlternateContent>
       <p:pic>
         <p:nvPicPr>
-          <p:cNvPr id="11" name="Picture 10">
+          <p:cNvPr id="3" name="Picture 2">
             <a:extLst>
               <a:ext uri="{FF2B5EF4-FFF2-40B4-BE49-F238E27FC236}">
-                <a16:creationId xmlns:a16="http://schemas.microsoft.com/office/drawing/2014/main" id="{3B56E701-5966-4FA6-8612-8C1BA099EE49}"/>
+                <a16:creationId xmlns:a16="http://schemas.microsoft.com/office/drawing/2014/main" id="{8598DF63-B6C5-4AD1-8B77-745246D201CB}"/>
               </a:ext>
             </a:extLst>
           </p:cNvPr>
@@ -14876,21 +14567,15 @@
           </p:cNvPicPr>
           <p:nvPr/>
         </p:nvPicPr>
-        <p:blipFill>
-          <a:blip r:embed="rId3">
-            <a:extLst>
-              <a:ext uri="{28A0092B-C50C-407E-A947-70E740481C1C}">
-                <a14:useLocalDpi xmlns:a14="http://schemas.microsoft.com/office/drawing/2010/main" val="0"/>
-              </a:ext>
-            </a:extLst>
-          </a:blip>
-          <a:srcRect l="4169" r="4169"/>
+        <p:blipFill rotWithShape="1">
+          <a:blip r:embed="rId3"/>
+          <a:srcRect r="7239"/>
           <a:stretch/>
         </p:blipFill>
         <p:spPr>
           <a:xfrm>
-            <a:off x="0" y="345293"/>
-            <a:ext cx="7174524" cy="5870380"/>
+            <a:off x="-360789" y="115752"/>
+            <a:ext cx="7845388" cy="6097608"/>
           </a:xfrm>
           <a:prstGeom prst="rect">
             <a:avLst/>
@@ -14985,8 +14670,8 @@
           </a:p>
         </p:txBody>
       </p:sp>
-      <mc:AlternateContent xmlns:mc="http://schemas.openxmlformats.org/markup-compatibility/2006">
-        <mc:Choice xmlns:a14="http://schemas.microsoft.com/office/drawing/2010/main" Requires="a14">
+      <mc:AlternateContent xmlns:mc="http://schemas.openxmlformats.org/markup-compatibility/2006" xmlns:a14="http://schemas.microsoft.com/office/drawing/2010/main">
+        <mc:Choice Requires="a14">
           <p:sp>
             <p:nvSpPr>
               <p:cNvPr id="9" name="Content Placeholder 2">
@@ -15177,7 +14862,7 @@
             </p:txBody>
           </p:sp>
         </mc:Choice>
-        <mc:Fallback>
+        <mc:Fallback xmlns="">
           <p:sp>
             <p:nvSpPr>
               <p:cNvPr id="9" name="Content Placeholder 2">
@@ -15223,10 +14908,10 @@
       </mc:AlternateContent>
       <p:pic>
         <p:nvPicPr>
-          <p:cNvPr id="11" name="Picture 10">
+          <p:cNvPr id="3" name="Picture 2">
             <a:extLst>
               <a:ext uri="{FF2B5EF4-FFF2-40B4-BE49-F238E27FC236}">
-                <a16:creationId xmlns:a16="http://schemas.microsoft.com/office/drawing/2014/main" id="{3B56E701-5966-4FA6-8612-8C1BA099EE49}"/>
+                <a16:creationId xmlns:a16="http://schemas.microsoft.com/office/drawing/2014/main" id="{923768F0-60D3-41C3-B39D-2BA2A451A7B4}"/>
               </a:ext>
             </a:extLst>
           </p:cNvPr>
@@ -15235,21 +14920,15 @@
           </p:cNvPicPr>
           <p:nvPr/>
         </p:nvPicPr>
-        <p:blipFill>
-          <a:blip r:embed="rId3">
-            <a:extLst>
-              <a:ext uri="{28A0092B-C50C-407E-A947-70E740481C1C}">
-                <a14:useLocalDpi xmlns:a14="http://schemas.microsoft.com/office/drawing/2010/main" val="0"/>
-              </a:ext>
-            </a:extLst>
-          </a:blip>
-          <a:srcRect l="4169" r="4169"/>
+        <p:blipFill rotWithShape="1">
+          <a:blip r:embed="rId3"/>
+          <a:srcRect r="8466"/>
           <a:stretch/>
         </p:blipFill>
         <p:spPr>
           <a:xfrm>
-            <a:off x="0" y="345293"/>
-            <a:ext cx="7174524" cy="5870380"/>
+            <a:off x="-246231" y="136525"/>
+            <a:ext cx="7561431" cy="6028301"/>
           </a:xfrm>
           <a:prstGeom prst="rect">
             <a:avLst/>
@@ -15773,8 +15452,8 @@
           </a:custGeom>
         </p:spPr>
       </p:pic>
-      <mc:AlternateContent xmlns:mc="http://schemas.openxmlformats.org/markup-compatibility/2006">
-        <mc:Choice xmlns:a14="http://schemas.microsoft.com/office/drawing/2010/main" Requires="a14">
+      <mc:AlternateContent xmlns:mc="http://schemas.openxmlformats.org/markup-compatibility/2006" xmlns:a14="http://schemas.microsoft.com/office/drawing/2010/main">
+        <mc:Choice Requires="a14">
           <p:sp>
             <p:nvSpPr>
               <p:cNvPr id="3" name="Content Placeholder 2">
@@ -15804,28 +15483,28 @@
               <a:lstStyle/>
               <a:p>
                 <a:r>
-                  <a:rPr lang="en-GB" sz="2000">
+                  <a:rPr lang="en-GB" sz="2000" dirty="0">
                     <a:latin typeface="Times New Roman" panose="02020603050405020304" pitchFamily="18" charset="0"/>
                     <a:cs typeface="Times New Roman" panose="02020603050405020304" pitchFamily="18" charset="0"/>
                   </a:rPr>
                   <a:t>Discretization</a:t>
                 </a:r>
                 <a:r>
-                  <a:rPr lang="en-GB" sz="2000" i="1">
+                  <a:rPr lang="en-GB" sz="2000" i="1" dirty="0">
                     <a:latin typeface="Times New Roman" panose="02020603050405020304" pitchFamily="18" charset="0"/>
                     <a:cs typeface="Times New Roman" panose="02020603050405020304" pitchFamily="18" charset="0"/>
                   </a:rPr>
                   <a:t> </a:t>
                 </a:r>
                 <a:r>
-                  <a:rPr lang="en-GB" sz="2000">
+                  <a:rPr lang="en-GB" sz="2000" dirty="0">
                     <a:latin typeface="Times New Roman" panose="02020603050405020304" pitchFamily="18" charset="0"/>
                     <a:cs typeface="Times New Roman" panose="02020603050405020304" pitchFamily="18" charset="0"/>
                   </a:rPr>
                   <a:t>of </a:t>
                 </a:r>
                 <a:r>
-                  <a:rPr lang="en-GB" sz="2000" b="1">
+                  <a:rPr lang="en-GB" sz="2000" b="1" dirty="0">
                     <a:latin typeface="Times New Roman" panose="02020603050405020304" pitchFamily="18" charset="0"/>
                     <a:cs typeface="Times New Roman" panose="02020603050405020304" pitchFamily="18" charset="0"/>
                   </a:rPr>
@@ -15835,7 +15514,7 @@
               <a:p>
                 <a:pPr lvl="1"/>
                 <a:r>
-                  <a:rPr lang="en-GB" sz="2000">
+                  <a:rPr lang="en-GB" sz="2000" dirty="0">
                     <a:latin typeface="Times New Roman" panose="02020603050405020304" pitchFamily="18" charset="0"/>
                     <a:cs typeface="Times New Roman" panose="02020603050405020304" pitchFamily="18" charset="0"/>
                   </a:rPr>
@@ -15870,7 +15549,7 @@
                   </m:oMath>
                 </a14:m>
                 <a:r>
-                  <a:rPr lang="en-GB" sz="2000">
+                  <a:rPr lang="en-GB" sz="2000" dirty="0">
                     <a:latin typeface="Times New Roman" panose="02020603050405020304" pitchFamily="18" charset="0"/>
                     <a:cs typeface="Times New Roman" panose="02020603050405020304" pitchFamily="18" charset="0"/>
                   </a:rPr>
@@ -15887,7 +15566,7 @@
                   </m:oMath>
                 </a14:m>
                 <a:r>
-                  <a:rPr lang="en-GB" sz="2000">
+                  <a:rPr lang="en-GB" sz="2000" dirty="0">
                     <a:latin typeface="Times New Roman" panose="02020603050405020304" pitchFamily="18" charset="0"/>
                     <a:cs typeface="Times New Roman" panose="02020603050405020304" pitchFamily="18" charset="0"/>
                   </a:rPr>
@@ -15903,14 +15582,14 @@
                     </m:r>
                   </m:oMath>
                 </a14:m>
-                <a:endParaRPr lang="en-GB" sz="2000">
+                <a:endParaRPr lang="en-GB" sz="2000" dirty="0">
                   <a:latin typeface="Times New Roman" panose="02020603050405020304" pitchFamily="18" charset="0"/>
                   <a:cs typeface="Times New Roman" panose="02020603050405020304" pitchFamily="18" charset="0"/>
                 </a:endParaRPr>
               </a:p>
               <a:p>
                 <a:r>
-                  <a:rPr lang="en-GB" sz="2000">
+                  <a:rPr lang="en-GB" sz="2000" dirty="0">
                     <a:latin typeface="Times New Roman" panose="02020603050405020304" pitchFamily="18" charset="0"/>
                     <a:cs typeface="Times New Roman" panose="02020603050405020304" pitchFamily="18" charset="0"/>
                   </a:rPr>
@@ -15920,7 +15599,7 @@
               <a:p>
                 <a:pPr lvl="1"/>
                 <a:r>
-                  <a:rPr lang="en-GB" sz="2000">
+                  <a:rPr lang="en-GB" sz="2000" dirty="0">
                     <a:latin typeface="Times New Roman" panose="02020603050405020304" pitchFamily="18" charset="0"/>
                     <a:cs typeface="Times New Roman" panose="02020603050405020304" pitchFamily="18" charset="0"/>
                   </a:rPr>
@@ -15930,7 +15609,7 @@
               <a:p>
                 <a:pPr lvl="1"/>
                 <a:r>
-                  <a:rPr lang="en-GB" sz="2000">
+                  <a:rPr lang="en-GB" sz="2000" dirty="0">
                     <a:latin typeface="Times New Roman" panose="02020603050405020304" pitchFamily="18" charset="0"/>
                     <a:cs typeface="Times New Roman" panose="02020603050405020304" pitchFamily="18" charset="0"/>
                   </a:rPr>
@@ -15940,7 +15619,7 @@
               <a:p>
                 <a:pPr lvl="1"/>
                 <a:r>
-                  <a:rPr lang="en-GB" sz="2000">
+                  <a:rPr lang="en-GB" sz="2000" dirty="0">
                     <a:latin typeface="Times New Roman" panose="02020603050405020304" pitchFamily="18" charset="0"/>
                     <a:cs typeface="Times New Roman" panose="02020603050405020304" pitchFamily="18" charset="0"/>
                   </a:rPr>
@@ -15950,7 +15629,7 @@
               <a:p>
                 <a:pPr lvl="1"/>
                 <a:r>
-                  <a:rPr lang="en-GB" sz="2000">
+                  <a:rPr lang="en-GB" sz="2000" dirty="0">
                     <a:latin typeface="Times New Roman" panose="02020603050405020304" pitchFamily="18" charset="0"/>
                     <a:cs typeface="Times New Roman" panose="02020603050405020304" pitchFamily="18" charset="0"/>
                   </a:rPr>
@@ -15960,7 +15639,7 @@
               <a:p>
                 <a:pPr lvl="1"/>
                 <a:r>
-                  <a:rPr lang="en-GB" sz="2000">
+                  <a:rPr lang="en-GB" sz="2000" dirty="0">
                     <a:latin typeface="Times New Roman" panose="02020603050405020304" pitchFamily="18" charset="0"/>
                     <a:cs typeface="Times New Roman" panose="02020603050405020304" pitchFamily="18" charset="0"/>
                   </a:rPr>
@@ -15970,7 +15649,7 @@
             </p:txBody>
           </p:sp>
         </mc:Choice>
-        <mc:Fallback>
+        <mc:Fallback xmlns="">
           <p:sp>
             <p:nvSpPr>
               <p:cNvPr id="3" name="Content Placeholder 2">
@@ -16246,8 +15925,8 @@
           </a:p>
         </p:txBody>
       </p:sp>
-      <mc:AlternateContent xmlns:mc="http://schemas.openxmlformats.org/markup-compatibility/2006">
-        <mc:Choice xmlns:a14="http://schemas.microsoft.com/office/drawing/2010/main" Requires="a14">
+      <mc:AlternateContent xmlns:mc="http://schemas.openxmlformats.org/markup-compatibility/2006" xmlns:a14="http://schemas.microsoft.com/office/drawing/2010/main">
+        <mc:Choice Requires="a14">
           <p:sp>
             <p:nvSpPr>
               <p:cNvPr id="9" name="Content Placeholder 2">
@@ -16435,7 +16114,7 @@
             </p:txBody>
           </p:sp>
         </mc:Choice>
-        <mc:Fallback>
+        <mc:Fallback xmlns="">
           <p:sp>
             <p:nvSpPr>
               <p:cNvPr id="9" name="Content Placeholder 2">
@@ -16481,10 +16160,10 @@
       </mc:AlternateContent>
       <p:pic>
         <p:nvPicPr>
-          <p:cNvPr id="11" name="Picture 10">
+          <p:cNvPr id="3" name="Picture 2">
             <a:extLst>
               <a:ext uri="{FF2B5EF4-FFF2-40B4-BE49-F238E27FC236}">
-                <a16:creationId xmlns:a16="http://schemas.microsoft.com/office/drawing/2014/main" id="{3B56E701-5966-4FA6-8612-8C1BA099EE49}"/>
+                <a16:creationId xmlns:a16="http://schemas.microsoft.com/office/drawing/2014/main" id="{E6575E22-38FF-4A8D-906D-3C6739537C24}"/>
               </a:ext>
             </a:extLst>
           </p:cNvPr>
@@ -16493,21 +16172,15 @@
           </p:cNvPicPr>
           <p:nvPr/>
         </p:nvPicPr>
-        <p:blipFill>
-          <a:blip r:embed="rId3">
-            <a:extLst>
-              <a:ext uri="{28A0092B-C50C-407E-A947-70E740481C1C}">
-                <a14:useLocalDpi xmlns:a14="http://schemas.microsoft.com/office/drawing/2010/main" val="0"/>
-              </a:ext>
-            </a:extLst>
-          </a:blip>
-          <a:srcRect l="4169" r="4169"/>
+        <p:blipFill rotWithShape="1">
+          <a:blip r:embed="rId3"/>
+          <a:srcRect r="7601"/>
           <a:stretch/>
         </p:blipFill>
         <p:spPr>
           <a:xfrm>
-            <a:off x="0" y="345293"/>
-            <a:ext cx="7174524" cy="5870380"/>
+            <a:off x="-444267" y="136525"/>
+            <a:ext cx="7702225" cy="6013376"/>
           </a:xfrm>
           <a:prstGeom prst="rect">
             <a:avLst/>
@@ -16636,8 +16309,8 @@
           </a:p>
         </p:txBody>
       </p:sp>
-      <mc:AlternateContent xmlns:mc="http://schemas.openxmlformats.org/markup-compatibility/2006">
-        <mc:Choice xmlns:a14="http://schemas.microsoft.com/office/drawing/2010/main" Requires="a14">
+      <mc:AlternateContent xmlns:mc="http://schemas.openxmlformats.org/markup-compatibility/2006" xmlns:a14="http://schemas.microsoft.com/office/drawing/2010/main">
+        <mc:Choice Requires="a14">
           <p:sp>
             <p:nvSpPr>
               <p:cNvPr id="8" name="Content Placeholder 2">
@@ -16902,7 +16575,7 @@
             </p:txBody>
           </p:sp>
         </mc:Choice>
-        <mc:Fallback>
+        <mc:Fallback xmlns="">
           <p:sp>
             <p:nvSpPr>
               <p:cNvPr id="8" name="Content Placeholder 2">
@@ -16961,6 +16634,300 @@
 </file>
 
 <file path=ppt/slides/slide22.xml><?xml version="1.0" encoding="utf-8"?>
+<p:sld xmlns:a="http://schemas.openxmlformats.org/drawingml/2006/main" xmlns:r="http://schemas.openxmlformats.org/officeDocument/2006/relationships" xmlns:p="http://schemas.openxmlformats.org/presentationml/2006/main">
+  <p:cSld>
+    <p:spTree>
+      <p:nvGrpSpPr>
+        <p:cNvPr id="1" name=""/>
+        <p:cNvGrpSpPr/>
+        <p:nvPr/>
+      </p:nvGrpSpPr>
+      <p:grpSpPr>
+        <a:xfrm>
+          <a:off x="0" y="0"/>
+          <a:ext cx="0" cy="0"/>
+          <a:chOff x="0" y="0"/>
+          <a:chExt cx="0" cy="0"/>
+        </a:xfrm>
+      </p:grpSpPr>
+      <p:sp>
+        <p:nvSpPr>
+          <p:cNvPr id="2" name="Title 1">
+            <a:extLst>
+              <a:ext uri="{FF2B5EF4-FFF2-40B4-BE49-F238E27FC236}">
+                <a16:creationId xmlns:a16="http://schemas.microsoft.com/office/drawing/2014/main" id="{404AC2EF-CF17-4CE6-AF28-F043B74DF10E}"/>
+              </a:ext>
+            </a:extLst>
+          </p:cNvPr>
+          <p:cNvSpPr>
+            <a:spLocks noGrp="1"/>
+          </p:cNvSpPr>
+          <p:nvPr>
+            <p:ph type="title"/>
+          </p:nvPr>
+        </p:nvSpPr>
+        <p:spPr/>
+        <p:txBody>
+          <a:bodyPr/>
+          <a:lstStyle/>
+          <a:p>
+            <a:r>
+              <a:rPr lang="en-GB" dirty="0"/>
+              <a:t>Parallelization</a:t>
+            </a:r>
+            <a:endParaRPr lang="LID4096" dirty="0"/>
+          </a:p>
+        </p:txBody>
+      </p:sp>
+      <p:sp>
+        <p:nvSpPr>
+          <p:cNvPr id="4" name="Footer Placeholder 3">
+            <a:extLst>
+              <a:ext uri="{FF2B5EF4-FFF2-40B4-BE49-F238E27FC236}">
+                <a16:creationId xmlns:a16="http://schemas.microsoft.com/office/drawing/2014/main" id="{DC2A5524-F7C7-407F-863A-EC500CA5B215}"/>
+              </a:ext>
+            </a:extLst>
+          </p:cNvPr>
+          <p:cNvSpPr>
+            <a:spLocks noGrp="1"/>
+          </p:cNvSpPr>
+          <p:nvPr>
+            <p:ph type="ftr" sz="quarter" idx="11"/>
+          </p:nvPr>
+        </p:nvSpPr>
+        <p:spPr/>
+        <p:txBody>
+          <a:bodyPr/>
+          <a:lstStyle/>
+          <a:p>
+            <a:r>
+              <a:rPr lang="en-GB" altLang="zh-CN"/>
+              <a:t>Ferdinand Vanmaele</a:t>
+            </a:r>
+            <a:endParaRPr lang="zh-CN" altLang="en-US"/>
+          </a:p>
+        </p:txBody>
+      </p:sp>
+      <p:sp>
+        <p:nvSpPr>
+          <p:cNvPr id="5" name="Slide Number Placeholder 4">
+            <a:extLst>
+              <a:ext uri="{FF2B5EF4-FFF2-40B4-BE49-F238E27FC236}">
+                <a16:creationId xmlns:a16="http://schemas.microsoft.com/office/drawing/2014/main" id="{DD16CC30-D042-4350-B7DF-F3D073019DF1}"/>
+              </a:ext>
+            </a:extLst>
+          </p:cNvPr>
+          <p:cNvSpPr>
+            <a:spLocks noGrp="1"/>
+          </p:cNvSpPr>
+          <p:nvPr>
+            <p:ph type="sldNum" sz="quarter" idx="12"/>
+          </p:nvPr>
+        </p:nvSpPr>
+        <p:spPr/>
+        <p:txBody>
+          <a:bodyPr/>
+          <a:lstStyle/>
+          <a:p>
+            <a:fld id="{37D6B00A-6C87-4154-AC06-CDD928942AC3}" type="slidenum">
+              <a:rPr lang="zh-CN" altLang="en-US" smtClean="0"/>
+              <a:t>22</a:t>
+            </a:fld>
+            <a:endParaRPr lang="zh-CN" altLang="en-US"/>
+          </a:p>
+        </p:txBody>
+      </p:sp>
+      <p:pic>
+        <p:nvPicPr>
+          <p:cNvPr id="7" name="Picture 6">
+            <a:extLst>
+              <a:ext uri="{FF2B5EF4-FFF2-40B4-BE49-F238E27FC236}">
+                <a16:creationId xmlns:a16="http://schemas.microsoft.com/office/drawing/2014/main" id="{7767B02C-75F4-49AF-A201-24E2F1ED363C}"/>
+              </a:ext>
+            </a:extLst>
+          </p:cNvPr>
+          <p:cNvPicPr>
+            <a:picLocks noChangeAspect="1"/>
+          </p:cNvPicPr>
+          <p:nvPr/>
+        </p:nvPicPr>
+        <p:blipFill>
+          <a:blip r:embed="rId2"/>
+          <a:stretch>
+            <a:fillRect/>
+          </a:stretch>
+        </p:blipFill>
+        <p:spPr>
+          <a:xfrm>
+            <a:off x="882443" y="1690687"/>
+            <a:ext cx="10515600" cy="4475725"/>
+          </a:xfrm>
+          <a:prstGeom prst="rect">
+            <a:avLst/>
+          </a:prstGeom>
+        </p:spPr>
+      </p:pic>
+    </p:spTree>
+    <p:extLst>
+      <p:ext uri="{BB962C8B-B14F-4D97-AF65-F5344CB8AC3E}">
+        <p14:creationId xmlns:p14="http://schemas.microsoft.com/office/powerpoint/2010/main" val="3120067596"/>
+      </p:ext>
+    </p:extLst>
+  </p:cSld>
+  <p:clrMapOvr>
+    <a:masterClrMapping/>
+  </p:clrMapOvr>
+</p:sld>
+</file>
+
+<file path=ppt/slides/slide23.xml><?xml version="1.0" encoding="utf-8"?>
+<p:sld xmlns:a="http://schemas.openxmlformats.org/drawingml/2006/main" xmlns:r="http://schemas.openxmlformats.org/officeDocument/2006/relationships" xmlns:p="http://schemas.openxmlformats.org/presentationml/2006/main">
+  <p:cSld>
+    <p:spTree>
+      <p:nvGrpSpPr>
+        <p:cNvPr id="1" name=""/>
+        <p:cNvGrpSpPr/>
+        <p:nvPr/>
+      </p:nvGrpSpPr>
+      <p:grpSpPr>
+        <a:xfrm>
+          <a:off x="0" y="0"/>
+          <a:ext cx="0" cy="0"/>
+          <a:chOff x="0" y="0"/>
+          <a:chExt cx="0" cy="0"/>
+        </a:xfrm>
+      </p:grpSpPr>
+      <p:sp>
+        <p:nvSpPr>
+          <p:cNvPr id="2" name="Title 1">
+            <a:extLst>
+              <a:ext uri="{FF2B5EF4-FFF2-40B4-BE49-F238E27FC236}">
+                <a16:creationId xmlns:a16="http://schemas.microsoft.com/office/drawing/2014/main" id="{404AC2EF-CF17-4CE6-AF28-F043B74DF10E}"/>
+              </a:ext>
+            </a:extLst>
+          </p:cNvPr>
+          <p:cNvSpPr>
+            <a:spLocks noGrp="1"/>
+          </p:cNvSpPr>
+          <p:nvPr>
+            <p:ph type="title"/>
+          </p:nvPr>
+        </p:nvSpPr>
+        <p:spPr/>
+        <p:txBody>
+          <a:bodyPr/>
+          <a:lstStyle/>
+          <a:p>
+            <a:r>
+              <a:rPr lang="en-GB" dirty="0"/>
+              <a:t>Parallelization</a:t>
+            </a:r>
+            <a:endParaRPr lang="LID4096" dirty="0"/>
+          </a:p>
+        </p:txBody>
+      </p:sp>
+      <p:sp>
+        <p:nvSpPr>
+          <p:cNvPr id="4" name="Footer Placeholder 3">
+            <a:extLst>
+              <a:ext uri="{FF2B5EF4-FFF2-40B4-BE49-F238E27FC236}">
+                <a16:creationId xmlns:a16="http://schemas.microsoft.com/office/drawing/2014/main" id="{DC2A5524-F7C7-407F-863A-EC500CA5B215}"/>
+              </a:ext>
+            </a:extLst>
+          </p:cNvPr>
+          <p:cNvSpPr>
+            <a:spLocks noGrp="1"/>
+          </p:cNvSpPr>
+          <p:nvPr>
+            <p:ph type="ftr" sz="quarter" idx="11"/>
+          </p:nvPr>
+        </p:nvSpPr>
+        <p:spPr/>
+        <p:txBody>
+          <a:bodyPr/>
+          <a:lstStyle/>
+          <a:p>
+            <a:r>
+              <a:rPr lang="en-GB" altLang="zh-CN"/>
+              <a:t>Ferdinand Vanmaele</a:t>
+            </a:r>
+            <a:endParaRPr lang="zh-CN" altLang="en-US"/>
+          </a:p>
+        </p:txBody>
+      </p:sp>
+      <p:sp>
+        <p:nvSpPr>
+          <p:cNvPr id="5" name="Slide Number Placeholder 4">
+            <a:extLst>
+              <a:ext uri="{FF2B5EF4-FFF2-40B4-BE49-F238E27FC236}">
+                <a16:creationId xmlns:a16="http://schemas.microsoft.com/office/drawing/2014/main" id="{DD16CC30-D042-4350-B7DF-F3D073019DF1}"/>
+              </a:ext>
+            </a:extLst>
+          </p:cNvPr>
+          <p:cNvSpPr>
+            <a:spLocks noGrp="1"/>
+          </p:cNvSpPr>
+          <p:nvPr>
+            <p:ph type="sldNum" sz="quarter" idx="12"/>
+          </p:nvPr>
+        </p:nvSpPr>
+        <p:spPr/>
+        <p:txBody>
+          <a:bodyPr/>
+          <a:lstStyle/>
+          <a:p>
+            <a:fld id="{37D6B00A-6C87-4154-AC06-CDD928942AC3}" type="slidenum">
+              <a:rPr lang="zh-CN" altLang="en-US" smtClean="0"/>
+              <a:t>23</a:t>
+            </a:fld>
+            <a:endParaRPr lang="zh-CN" altLang="en-US"/>
+          </a:p>
+        </p:txBody>
+      </p:sp>
+      <p:pic>
+        <p:nvPicPr>
+          <p:cNvPr id="6" name="Picture 5">
+            <a:extLst>
+              <a:ext uri="{FF2B5EF4-FFF2-40B4-BE49-F238E27FC236}">
+                <a16:creationId xmlns:a16="http://schemas.microsoft.com/office/drawing/2014/main" id="{3A9901CB-8D82-467A-8ECE-24B02EADE560}"/>
+              </a:ext>
+            </a:extLst>
+          </p:cNvPr>
+          <p:cNvPicPr>
+            <a:picLocks noChangeAspect="1"/>
+          </p:cNvPicPr>
+          <p:nvPr/>
+        </p:nvPicPr>
+        <p:blipFill>
+          <a:blip r:embed="rId2"/>
+          <a:stretch>
+            <a:fillRect/>
+          </a:stretch>
+        </p:blipFill>
+        <p:spPr>
+          <a:xfrm>
+            <a:off x="996425" y="1690688"/>
+            <a:ext cx="9974067" cy="4534533"/>
+          </a:xfrm>
+          <a:prstGeom prst="rect">
+            <a:avLst/>
+          </a:prstGeom>
+        </p:spPr>
+      </p:pic>
+    </p:spTree>
+    <p:extLst>
+      <p:ext uri="{BB962C8B-B14F-4D97-AF65-F5344CB8AC3E}">
+        <p14:creationId xmlns:p14="http://schemas.microsoft.com/office/powerpoint/2010/main" val="463809609"/>
+      </p:ext>
+    </p:extLst>
+  </p:cSld>
+  <p:clrMapOvr>
+    <a:masterClrMapping/>
+  </p:clrMapOvr>
+</p:sld>
+</file>
+
+<file path=ppt/slides/slide24.xml><?xml version="1.0" encoding="utf-8"?>
 <p:sld xmlns:a="http://schemas.openxmlformats.org/drawingml/2006/main" xmlns:r="http://schemas.openxmlformats.org/officeDocument/2006/relationships" xmlns:p="http://schemas.openxmlformats.org/presentationml/2006/main">
   <p:cSld>
     <p:spTree>
@@ -17167,7 +17134,7 @@
           <a:p>
             <a:fld id="{37D6B00A-6C87-4154-AC06-CDD928942AC3}" type="slidenum">
               <a:rPr lang="zh-CN" altLang="en-US" smtClean="0"/>
-              <a:t>22</a:t>
+              <a:t>24</a:t>
             </a:fld>
             <a:endParaRPr lang="zh-CN" altLang="en-US"/>
           </a:p>
@@ -17186,7 +17153,7 @@
 </p:sld>
 </file>
 
-<file path=ppt/slides/slide23.xml><?xml version="1.0" encoding="utf-8"?>
+<file path=ppt/slides/slide25.xml><?xml version="1.0" encoding="utf-8"?>
 <p:sld xmlns:a="http://schemas.openxmlformats.org/drawingml/2006/main" xmlns:r="http://schemas.openxmlformats.org/officeDocument/2006/relationships" xmlns:p="http://schemas.openxmlformats.org/presentationml/2006/main">
   <p:cSld>
     <p:spTree>
@@ -17290,7 +17257,7 @@
           <a:p>
             <a:fld id="{37D6B00A-6C87-4154-AC06-CDD928942AC3}" type="slidenum">
               <a:rPr lang="zh-CN" altLang="en-US" smtClean="0"/>
-              <a:t>23</a:t>
+              <a:t>25</a:t>
             </a:fld>
             <a:endParaRPr lang="zh-CN" altLang="en-US"/>
           </a:p>
@@ -17361,8 +17328,8 @@
           </a:p>
         </p:txBody>
       </p:sp>
-      <mc:AlternateContent xmlns:mc="http://schemas.openxmlformats.org/markup-compatibility/2006">
-        <mc:Choice xmlns:a14="http://schemas.microsoft.com/office/drawing/2010/main" Requires="a14">
+      <mc:AlternateContent xmlns:mc="http://schemas.openxmlformats.org/markup-compatibility/2006" xmlns:a14="http://schemas.microsoft.com/office/drawing/2010/main">
+        <mc:Choice Requires="a14">
           <p:sp>
             <p:nvSpPr>
               <p:cNvPr id="3" name="Content Placeholder 2">
@@ -17387,7 +17354,7 @@
             </p:spPr>
             <p:txBody>
               <a:bodyPr>
-                <a:normAutofit fontScale="92500" lnSpcReduction="10000"/>
+                <a:normAutofit/>
               </a:bodyPr>
               <a:lstStyle/>
               <a:p>
@@ -17413,11 +17380,11 @@
                     <a:latin typeface="Times New Roman" panose="02020603050405020304" pitchFamily="18" charset="0"/>
                     <a:cs typeface="Times New Roman" panose="02020603050405020304" pitchFamily="18" charset="0"/>
                   </a:rPr>
-                  <a:t>Model problem</a:t>
+                  <a:t>Circle Eigenvalue Matrix</a:t>
                 </a:r>
               </a:p>
               <a:p>
-                <a:pPr>
+                <a:pPr lvl="1">
                   <a:buFont typeface="Wingdings" panose="05000000000000000000" pitchFamily="2" charset="2"/>
                   <a:buChar char="§"/>
                 </a:pPr>
@@ -17426,162 +17393,7 @@
                     <a:latin typeface="Times New Roman" panose="02020603050405020304" pitchFamily="18" charset="0"/>
                     <a:cs typeface="Times New Roman" panose="02020603050405020304" pitchFamily="18" charset="0"/>
                   </a:rPr>
-                  <a:t>Matrix </a:t>
-                </a:r>
-                <a14:m>
-                  <m:oMath xmlns:m="http://schemas.openxmlformats.org/officeDocument/2006/math">
-                    <m:r>
-                      <a:rPr lang="en-GB" i="1">
-                        <a:latin typeface="Cambria Math" panose="02040503050406030204" pitchFamily="18" charset="0"/>
-                        <a:cs typeface="Times New Roman" panose="02020603050405020304" pitchFamily="18" charset="0"/>
-                      </a:rPr>
-                      <m:t>𝐴</m:t>
-                    </m:r>
-                    <m:r>
-                      <a:rPr lang="en-GB" b="0" i="1" smtClean="0">
-                        <a:latin typeface="Cambria Math" panose="02040503050406030204" pitchFamily="18" charset="0"/>
-                        <a:cs typeface="Times New Roman" panose="02020603050405020304" pitchFamily="18" charset="0"/>
-                      </a:rPr>
-                      <m:t>∈</m:t>
-                    </m:r>
-                    <m:sSup>
-                      <m:sSupPr>
-                        <m:ctrlPr>
-                          <a:rPr lang="en-GB" b="0" i="1" smtClean="0">
-                            <a:latin typeface="Cambria Math" panose="02040503050406030204" pitchFamily="18" charset="0"/>
-                            <a:cs typeface="Times New Roman" panose="02020603050405020304" pitchFamily="18" charset="0"/>
-                          </a:rPr>
-                        </m:ctrlPr>
-                      </m:sSupPr>
-                      <m:e>
-                        <m:r>
-                          <a:rPr lang="en-GB" b="0" i="1" smtClean="0">
-                            <a:latin typeface="Cambria Math" panose="02040503050406030204" pitchFamily="18" charset="0"/>
-                            <a:cs typeface="Times New Roman" panose="02020603050405020304" pitchFamily="18" charset="0"/>
-                          </a:rPr>
-                          <m:t>𝑅</m:t>
-                        </m:r>
-                      </m:e>
-                      <m:sup>
-                        <m:r>
-                          <a:rPr lang="en-GB" b="0" i="1" smtClean="0">
-                            <a:latin typeface="Cambria Math" panose="02040503050406030204" pitchFamily="18" charset="0"/>
-                            <a:cs typeface="Times New Roman" panose="02020603050405020304" pitchFamily="18" charset="0"/>
-                          </a:rPr>
-                          <m:t>𝑛</m:t>
-                        </m:r>
-                        <m:r>
-                          <a:rPr lang="en-GB" b="0" i="1" smtClean="0">
-                            <a:latin typeface="Cambria Math" panose="02040503050406030204" pitchFamily="18" charset="0"/>
-                            <a:cs typeface="Times New Roman" panose="02020603050405020304" pitchFamily="18" charset="0"/>
-                          </a:rPr>
-                          <m:t>×</m:t>
-                        </m:r>
-                        <m:r>
-                          <a:rPr lang="en-GB" b="0" i="1" smtClean="0">
-                            <a:latin typeface="Cambria Math" panose="02040503050406030204" pitchFamily="18" charset="0"/>
-                            <a:cs typeface="Times New Roman" panose="02020603050405020304" pitchFamily="18" charset="0"/>
-                          </a:rPr>
-                          <m:t>𝑛</m:t>
-                        </m:r>
-                      </m:sup>
-                    </m:sSup>
-                  </m:oMath>
-                </a14:m>
-                <a:endParaRPr lang="en-GB" dirty="0">
-                  <a:latin typeface="Times New Roman" panose="02020603050405020304" pitchFamily="18" charset="0"/>
-                  <a:cs typeface="Times New Roman" panose="02020603050405020304" pitchFamily="18" charset="0"/>
-                </a:endParaRPr>
-              </a:p>
-              <a:p>
-                <a:pPr lvl="1"/>
-                <a:r>
-                  <a:rPr lang="en-GB" dirty="0">
-                    <a:latin typeface="Times New Roman" panose="02020603050405020304" pitchFamily="18" charset="0"/>
-                    <a:cs typeface="Times New Roman" panose="02020603050405020304" pitchFamily="18" charset="0"/>
-                  </a:rPr>
-                  <a:t>Possible non-symmetric or indefinite</a:t>
-                </a:r>
-              </a:p>
-              <a:p>
-                <a:pPr lvl="1"/>
-                <a:r>
-                  <a:rPr lang="en-GB" dirty="0">
-                    <a:latin typeface="Times New Roman" panose="02020603050405020304" pitchFamily="18" charset="0"/>
-                    <a:cs typeface="Times New Roman" panose="02020603050405020304" pitchFamily="18" charset="0"/>
-                  </a:rPr>
-                  <a:t>Sparse of high dimension </a:t>
-                </a:r>
-                <a14:m>
-                  <m:oMath xmlns:m="http://schemas.openxmlformats.org/officeDocument/2006/math">
-                    <m:r>
-                      <a:rPr lang="en-GB" b="0" i="1" smtClean="0">
-                        <a:latin typeface="Cambria Math" panose="02040503050406030204" pitchFamily="18" charset="0"/>
-                        <a:cs typeface="Times New Roman" panose="02020603050405020304" pitchFamily="18" charset="0"/>
-                      </a:rPr>
-                      <m:t>𝑛</m:t>
-                    </m:r>
-                  </m:oMath>
-                </a14:m>
-                <a:r>
-                  <a:rPr lang="en-GB" dirty="0">
-                    <a:latin typeface="Times New Roman" panose="02020603050405020304" pitchFamily="18" charset="0"/>
-                    <a:cs typeface="Times New Roman" panose="02020603050405020304" pitchFamily="18" charset="0"/>
-                  </a:rPr>
-                  <a:t> (e.g. </a:t>
-                </a:r>
-                <a14:m>
-                  <m:oMath xmlns:m="http://schemas.openxmlformats.org/officeDocument/2006/math">
-                    <m:r>
-                      <a:rPr lang="en-GB" b="0" i="1" smtClean="0">
-                        <a:latin typeface="Cambria Math" panose="02040503050406030204" pitchFamily="18" charset="0"/>
-                        <a:cs typeface="Times New Roman" panose="02020603050405020304" pitchFamily="18" charset="0"/>
-                      </a:rPr>
-                      <m:t>𝑛</m:t>
-                    </m:r>
-                    <m:r>
-                      <a:rPr lang="en-GB" b="0" i="1" smtClean="0">
-                        <a:latin typeface="Cambria Math" panose="02040503050406030204" pitchFamily="18" charset="0"/>
-                        <a:cs typeface="Times New Roman" panose="02020603050405020304" pitchFamily="18" charset="0"/>
-                      </a:rPr>
-                      <m:t>=</m:t>
-                    </m:r>
-                    <m:sSup>
-                      <m:sSupPr>
-                        <m:ctrlPr>
-                          <a:rPr lang="en-GB" b="0" i="1" smtClean="0">
-                            <a:latin typeface="Cambria Math" panose="02040503050406030204" pitchFamily="18" charset="0"/>
-                            <a:cs typeface="Times New Roman" panose="02020603050405020304" pitchFamily="18" charset="0"/>
-                          </a:rPr>
-                        </m:ctrlPr>
-                      </m:sSupPr>
-                      <m:e>
-                        <m:r>
-                          <a:rPr lang="en-GB" b="0" i="1" smtClean="0">
-                            <a:latin typeface="Cambria Math" panose="02040503050406030204" pitchFamily="18" charset="0"/>
-                            <a:cs typeface="Times New Roman" panose="02020603050405020304" pitchFamily="18" charset="0"/>
-                          </a:rPr>
-                          <m:t>10</m:t>
-                        </m:r>
-                      </m:e>
-                      <m:sup>
-                        <m:r>
-                          <a:rPr lang="en-GB" b="0" i="1" smtClean="0">
-                            <a:latin typeface="Cambria Math" panose="02040503050406030204" pitchFamily="18" charset="0"/>
-                            <a:cs typeface="Times New Roman" panose="02020603050405020304" pitchFamily="18" charset="0"/>
-                          </a:rPr>
-                          <m:t>12</m:t>
-                        </m:r>
-                      </m:sup>
-                    </m:sSup>
-                  </m:oMath>
-                </a14:m>
-                <a:r>
-                  <a:rPr lang="en-GB" dirty="0">
-                    <a:latin typeface="Times New Roman" panose="02020603050405020304" pitchFamily="18" charset="0"/>
-                    <a:cs typeface="Times New Roman" panose="02020603050405020304" pitchFamily="18" charset="0"/>
-                  </a:rPr>
-                  <a:t>)</a:t>
+                  <a:t>Model problem</a:t>
                 </a:r>
               </a:p>
               <a:p>
@@ -17923,7 +17735,7 @@
             </p:txBody>
           </p:sp>
         </mc:Choice>
-        <mc:Fallback>
+        <mc:Fallback xmlns="">
           <p:sp>
             <p:nvSpPr>
               <p:cNvPr id="3" name="Content Placeholder 2">
@@ -17948,7 +17760,7 @@
               <a:blipFill>
                 <a:blip r:embed="rId2"/>
                 <a:stretch>
-                  <a:fillRect l="-928" t="-3081"/>
+                  <a:fillRect l="-1043" t="-2521"/>
                 </a:stretch>
               </a:blipFill>
             </p:spPr>
@@ -21995,8 +21807,8 @@
           </a:p>
         </p:txBody>
       </p:sp>
-      <mc:AlternateContent xmlns:mc="http://schemas.openxmlformats.org/markup-compatibility/2006">
-        <mc:Choice xmlns:a14="http://schemas.microsoft.com/office/drawing/2010/main" Requires="a14">
+      <mc:AlternateContent xmlns:mc="http://schemas.openxmlformats.org/markup-compatibility/2006" xmlns:a14="http://schemas.microsoft.com/office/drawing/2010/main">
+        <mc:Choice Requires="a14">
           <p:sp>
             <p:nvSpPr>
               <p:cNvPr id="3" name="Content Placeholder 2">
@@ -23058,7 +22870,7 @@
             </p:txBody>
           </p:sp>
         </mc:Choice>
-        <mc:Fallback>
+        <mc:Fallback xmlns="">
           <p:sp>
             <p:nvSpPr>
               <p:cNvPr id="3" name="Content Placeholder 2">

</xml_diff>